<commit_message>
Nossa motivacao, o que é, como funciona e quem se beneficia no ppt
</commit_message>
<xml_diff>
--- a/ppt/TopBeer.pptx
+++ b/ppt/TopBeer.pptx
@@ -9,8 +9,11 @@
     <p:sldId id="256" r:id="rId3"/>
     <p:sldId id="260" r:id="rId4"/>
     <p:sldId id="257" r:id="rId5"/>
-    <p:sldId id="258" r:id="rId6"/>
-    <p:sldId id="259" r:id="rId7"/>
+    <p:sldId id="259" r:id="rId6"/>
+    <p:sldId id="258" r:id="rId7"/>
+    <p:sldId id="261" r:id="rId8"/>
+    <p:sldId id="263" r:id="rId9"/>
+    <p:sldId id="262" r:id="rId10"/>
   </p:sldIdLst>
   <p:sldSz cx="12192000" cy="6858000"/>
   <p:notesSz cx="6858000" cy="9144000"/>
@@ -5860,90 +5863,6 @@
           <a:chExt cx="0" cy="0"/>
         </a:xfrm>
       </p:grpSpPr>
-      <p:sp>
-        <p:nvSpPr>
-          <p:cNvPr id="2" name="Título 1"/>
-          <p:cNvSpPr>
-            <a:spLocks noGrp="1"/>
-          </p:cNvSpPr>
-          <p:nvPr>
-            <p:ph type="ctrTitle"/>
-          </p:nvPr>
-        </p:nvSpPr>
-        <p:spPr/>
-        <p:txBody>
-          <a:bodyPr>
-            <a:normAutofit/>
-          </a:bodyPr>
-          <a:lstStyle/>
-          <a:p>
-            <a:r>
-              <a:rPr lang="pt-BR" sz="8800" dirty="0" err="1" smtClean="0">
-                <a:solidFill>
-                  <a:schemeClr val="bg1"/>
-                </a:solidFill>
-                <a:latin typeface="Century Gothic" panose="020B0502020202020204" pitchFamily="34" charset="0"/>
-              </a:rPr>
-              <a:t>TopBeer</a:t>
-            </a:r>
-            <a:endParaRPr lang="en-US" sz="8800" dirty="0">
-              <a:solidFill>
-                <a:schemeClr val="bg1"/>
-              </a:solidFill>
-              <a:latin typeface="Century Gothic" panose="020B0502020202020204" pitchFamily="34" charset="0"/>
-            </a:endParaRPr>
-          </a:p>
-        </p:txBody>
-      </p:sp>
-      <p:sp>
-        <p:nvSpPr>
-          <p:cNvPr id="3" name="Subtítulo 2"/>
-          <p:cNvSpPr>
-            <a:spLocks noGrp="1"/>
-          </p:cNvSpPr>
-          <p:nvPr>
-            <p:ph type="subTitle" idx="1"/>
-          </p:nvPr>
-        </p:nvSpPr>
-        <p:spPr/>
-        <p:txBody>
-          <a:bodyPr/>
-          <a:lstStyle/>
-          <a:p>
-            <a:endParaRPr lang="en-US" dirty="0"/>
-          </a:p>
-        </p:txBody>
-      </p:sp>
-      <p:pic>
-        <p:nvPicPr>
-          <p:cNvPr id="4" name="Imagem 3"/>
-          <p:cNvPicPr>
-            <a:picLocks noChangeAspect="1"/>
-          </p:cNvPicPr>
-          <p:nvPr/>
-        </p:nvPicPr>
-        <p:blipFill>
-          <a:blip r:embed="rId2">
-            <a:extLst>
-              <a:ext uri="{28A0092B-C50C-407E-A947-70E740481C1C}">
-                <a14:useLocalDpi xmlns:a14="http://schemas.microsoft.com/office/drawing/2010/main" val="0"/>
-              </a:ext>
-            </a:extLst>
-          </a:blip>
-          <a:stretch>
-            <a:fillRect/>
-          </a:stretch>
-        </p:blipFill>
-        <p:spPr>
-          <a:xfrm>
-            <a:off x="3784209" y="861382"/>
-            <a:ext cx="4988736" cy="5013311"/>
-          </a:xfrm>
-          <a:prstGeom prst="rect">
-            <a:avLst/>
-          </a:prstGeom>
-        </p:spPr>
-      </p:pic>
     </p:spTree>
     <p:extLst>
       <p:ext uri="{BB962C8B-B14F-4D97-AF65-F5344CB8AC3E}">
@@ -5954,13 +5873,13 @@
   <p:clrMapOvr>
     <a:masterClrMapping/>
   </p:clrMapOvr>
-  <mc:AlternateContent xmlns:mc="http://schemas.openxmlformats.org/markup-compatibility/2006">
-    <mc:Choice xmlns:p14="http://schemas.microsoft.com/office/powerpoint/2010/main" Requires="p14">
+  <mc:AlternateContent xmlns:mc="http://schemas.openxmlformats.org/markup-compatibility/2006" xmlns:p14="http://schemas.microsoft.com/office/powerpoint/2010/main">
+    <mc:Choice Requires="p14">
       <p:transition spd="slow" p14:dur="800">
         <p:circle/>
       </p:transition>
     </mc:Choice>
-    <mc:Fallback>
+    <mc:Fallback xmlns="">
       <p:transition spd="slow">
         <p:circle/>
       </p:transition>
@@ -5979,6 +5898,14 @@
 <file path=ppt/slides/slide2.xml><?xml version="1.0" encoding="utf-8"?>
 <p:sld xmlns:a="http://schemas.openxmlformats.org/drawingml/2006/main" xmlns:r="http://schemas.openxmlformats.org/officeDocument/2006/relationships" xmlns:p="http://schemas.openxmlformats.org/presentationml/2006/main">
   <p:cSld>
+    <p:bg>
+      <p:bgPr>
+        <a:solidFill>
+          <a:schemeClr val="accent1"/>
+        </a:solidFill>
+        <a:effectLst/>
+      </p:bgPr>
+    </p:bg>
     <p:spTree>
       <p:nvGrpSpPr>
         <p:cNvPr id="1" name=""/>
@@ -6080,6 +6007,18 @@
         <p:blipFill>
           <a:blip r:embed="rId2">
             <a:extLst>
+              <a:ext uri="{BEBA8EAE-BF5A-486C-A8C5-ECC9F3942E4B}">
+                <a14:imgProps xmlns:a14="http://schemas.microsoft.com/office/drawing/2010/main">
+                  <a14:imgLayer r:embed="rId3">
+                    <a14:imgEffect>
+                      <a14:colorTemperature colorTemp="4224"/>
+                    </a14:imgEffect>
+                    <a14:imgEffect>
+                      <a14:brightnessContrast bright="20000"/>
+                    </a14:imgEffect>
+                  </a14:imgLayer>
+                </a14:imgProps>
+              </a:ext>
               <a:ext uri="{28A0092B-C50C-407E-A947-70E740481C1C}">
                 <a14:useLocalDpi xmlns:a14="http://schemas.microsoft.com/office/drawing/2010/main" val="0"/>
               </a:ext>
@@ -6100,7 +6039,13 @@
           </a:prstGeom>
           <a:noFill/>
           <a:effectLst>
-            <a:softEdge rad="228600"/>
+            <a:glow rad="127000">
+              <a:schemeClr val="accent1">
+                <a:alpha val="0"/>
+              </a:schemeClr>
+            </a:glow>
+            <a:reflection endPos="0" dist="50800" dir="5400000" sy="-100000" algn="bl" rotWithShape="0"/>
+            <a:softEdge rad="152400"/>
           </a:effectLst>
           <a:extLst>
             <a:ext uri="{909E8E84-426E-40DD-AFC4-6F175D3DCCD1}">
@@ -6165,7 +6110,7 @@
         </p:nvSpPr>
         <p:spPr>
           <a:xfrm>
-            <a:off x="781929" y="336273"/>
+            <a:off x="961781" y="368520"/>
             <a:ext cx="10515600" cy="1325563"/>
           </a:xfrm>
         </p:spPr>
@@ -6210,8 +6155,104 @@
         </p:blipFill>
         <p:spPr>
           <a:xfrm>
-            <a:off x="7700775" y="2996417"/>
-            <a:ext cx="2190274" cy="2339151"/>
+            <a:off x="4321052" y="2173991"/>
+            <a:ext cx="3325113" cy="3551127"/>
+          </a:xfrm>
+          <a:prstGeom prst="rect">
+            <a:avLst/>
+          </a:prstGeom>
+        </p:spPr>
+      </p:pic>
+      <p:pic>
+        <p:nvPicPr>
+          <p:cNvPr id="4" name="Imagem 3"/>
+          <p:cNvPicPr>
+            <a:picLocks noChangeAspect="1"/>
+          </p:cNvPicPr>
+          <p:nvPr/>
+        </p:nvPicPr>
+        <p:blipFill>
+          <a:blip r:embed="rId3"/>
+          <a:stretch>
+            <a:fillRect/>
+          </a:stretch>
+        </p:blipFill>
+        <p:spPr>
+          <a:xfrm>
+            <a:off x="3838030" y="3303518"/>
+            <a:ext cx="3962956" cy="1611680"/>
+          </a:xfrm>
+          <a:prstGeom prst="rect">
+            <a:avLst/>
+          </a:prstGeom>
+        </p:spPr>
+      </p:pic>
+      <p:pic>
+        <p:nvPicPr>
+          <p:cNvPr id="6" name="Imagem 5"/>
+          <p:cNvPicPr>
+            <a:picLocks noChangeAspect="1"/>
+          </p:cNvPicPr>
+          <p:nvPr/>
+        </p:nvPicPr>
+        <p:blipFill>
+          <a:blip r:embed="rId4"/>
+          <a:stretch>
+            <a:fillRect/>
+          </a:stretch>
+        </p:blipFill>
+        <p:spPr>
+          <a:xfrm>
+            <a:off x="6553721" y="2173991"/>
+            <a:ext cx="3803008" cy="2846391"/>
+          </a:xfrm>
+          <a:prstGeom prst="rect">
+            <a:avLst/>
+          </a:prstGeom>
+        </p:spPr>
+      </p:pic>
+      <p:pic>
+        <p:nvPicPr>
+          <p:cNvPr id="9" name="Imagem 8"/>
+          <p:cNvPicPr>
+            <a:picLocks noChangeAspect="1"/>
+          </p:cNvPicPr>
+          <p:nvPr/>
+        </p:nvPicPr>
+        <p:blipFill>
+          <a:blip r:embed="rId5"/>
+          <a:stretch>
+            <a:fillRect/>
+          </a:stretch>
+        </p:blipFill>
+        <p:spPr>
+          <a:xfrm>
+            <a:off x="4676577" y="2343703"/>
+            <a:ext cx="2614059" cy="3324844"/>
+          </a:xfrm>
+          <a:prstGeom prst="rect">
+            <a:avLst/>
+          </a:prstGeom>
+        </p:spPr>
+      </p:pic>
+      <p:pic>
+        <p:nvPicPr>
+          <p:cNvPr id="12" name="Imagem 11"/>
+          <p:cNvPicPr>
+            <a:picLocks noChangeAspect="1"/>
+          </p:cNvPicPr>
+          <p:nvPr/>
+        </p:nvPicPr>
+        <p:blipFill>
+          <a:blip r:embed="rId6"/>
+          <a:stretch>
+            <a:fillRect/>
+          </a:stretch>
+        </p:blipFill>
+        <p:spPr>
+          <a:xfrm>
+            <a:off x="3729333" y="2233695"/>
+            <a:ext cx="4180349" cy="3378281"/>
           </a:xfrm>
           <a:prstGeom prst="rect">
             <a:avLst/>
@@ -6228,10 +6269,571 @@
   <p:clrMapOvr>
     <a:masterClrMapping/>
   </p:clrMapOvr>
+  <p:transition spd="slow">
+    <p:push dir="u"/>
+  </p:transition>
   <p:timing>
     <p:tnLst>
       <p:par>
-        <p:cTn id="1" dur="indefinite" restart="never" nodeType="tmRoot"/>
+        <p:cTn id="1" dur="indefinite" restart="never" nodeType="tmRoot">
+          <p:childTnLst>
+            <p:seq concurrent="1" nextAc="seek">
+              <p:cTn id="2" dur="indefinite" nodeType="mainSeq">
+                <p:childTnLst>
+                  <p:par>
+                    <p:cTn id="3" fill="hold">
+                      <p:stCondLst>
+                        <p:cond delay="indefinite"/>
+                      </p:stCondLst>
+                      <p:childTnLst>
+                        <p:par>
+                          <p:cTn id="4" fill="hold">
+                            <p:stCondLst>
+                              <p:cond delay="0"/>
+                            </p:stCondLst>
+                            <p:childTnLst>
+                              <p:par>
+                                <p:cTn id="5" presetID="10" presetClass="entr" presetSubtype="0" fill="hold" nodeType="clickEffect">
+                                  <p:stCondLst>
+                                    <p:cond delay="0"/>
+                                  </p:stCondLst>
+                                  <p:childTnLst>
+                                    <p:set>
+                                      <p:cBhvr>
+                                        <p:cTn id="6" dur="1" fill="hold">
+                                          <p:stCondLst>
+                                            <p:cond delay="0"/>
+                                          </p:stCondLst>
+                                        </p:cTn>
+                                        <p:tgtEl>
+                                          <p:spTgt spid="10"/>
+                                        </p:tgtEl>
+                                        <p:attrNameLst>
+                                          <p:attrName>style.visibility</p:attrName>
+                                        </p:attrNameLst>
+                                      </p:cBhvr>
+                                      <p:to>
+                                        <p:strVal val="visible"/>
+                                      </p:to>
+                                    </p:set>
+                                    <p:animEffect transition="in" filter="fade">
+                                      <p:cBhvr>
+                                        <p:cTn id="7" dur="500"/>
+                                        <p:tgtEl>
+                                          <p:spTgt spid="10"/>
+                                        </p:tgtEl>
+                                      </p:cBhvr>
+                                    </p:animEffect>
+                                  </p:childTnLst>
+                                </p:cTn>
+                              </p:par>
+                            </p:childTnLst>
+                          </p:cTn>
+                        </p:par>
+                      </p:childTnLst>
+                    </p:cTn>
+                  </p:par>
+                  <p:par>
+                    <p:cTn id="8" fill="hold">
+                      <p:stCondLst>
+                        <p:cond delay="indefinite"/>
+                      </p:stCondLst>
+                      <p:childTnLst>
+                        <p:par>
+                          <p:cTn id="9" fill="hold">
+                            <p:stCondLst>
+                              <p:cond delay="0"/>
+                            </p:stCondLst>
+                            <p:childTnLst>
+                              <p:par>
+                                <p:cTn id="10" presetID="10" presetClass="exit" presetSubtype="0" fill="hold" nodeType="clickEffect">
+                                  <p:stCondLst>
+                                    <p:cond delay="0"/>
+                                  </p:stCondLst>
+                                  <p:childTnLst>
+                                    <p:animEffect transition="out" filter="fade">
+                                      <p:cBhvr>
+                                        <p:cTn id="11" dur="500"/>
+                                        <p:tgtEl>
+                                          <p:spTgt spid="10"/>
+                                        </p:tgtEl>
+                                      </p:cBhvr>
+                                    </p:animEffect>
+                                    <p:set>
+                                      <p:cBhvr>
+                                        <p:cTn id="12" dur="1" fill="hold">
+                                          <p:stCondLst>
+                                            <p:cond delay="499"/>
+                                          </p:stCondLst>
+                                        </p:cTn>
+                                        <p:tgtEl>
+                                          <p:spTgt spid="10"/>
+                                        </p:tgtEl>
+                                        <p:attrNameLst>
+                                          <p:attrName>style.visibility</p:attrName>
+                                        </p:attrNameLst>
+                                      </p:cBhvr>
+                                      <p:to>
+                                        <p:strVal val="hidden"/>
+                                      </p:to>
+                                    </p:set>
+                                  </p:childTnLst>
+                                </p:cTn>
+                              </p:par>
+                            </p:childTnLst>
+                          </p:cTn>
+                        </p:par>
+                        <p:par>
+                          <p:cTn id="13" fill="hold">
+                            <p:stCondLst>
+                              <p:cond delay="500"/>
+                            </p:stCondLst>
+                            <p:childTnLst>
+                              <p:par>
+                                <p:cTn id="14" presetID="10" presetClass="entr" presetSubtype="0" fill="hold" nodeType="afterEffect">
+                                  <p:stCondLst>
+                                    <p:cond delay="0"/>
+                                  </p:stCondLst>
+                                  <p:childTnLst>
+                                    <p:set>
+                                      <p:cBhvr>
+                                        <p:cTn id="15" dur="1" fill="hold">
+                                          <p:stCondLst>
+                                            <p:cond delay="0"/>
+                                          </p:stCondLst>
+                                        </p:cTn>
+                                        <p:tgtEl>
+                                          <p:spTgt spid="12"/>
+                                        </p:tgtEl>
+                                        <p:attrNameLst>
+                                          <p:attrName>style.visibility</p:attrName>
+                                        </p:attrNameLst>
+                                      </p:cBhvr>
+                                      <p:to>
+                                        <p:strVal val="visible"/>
+                                      </p:to>
+                                    </p:set>
+                                    <p:animEffect transition="in" filter="fade">
+                                      <p:cBhvr>
+                                        <p:cTn id="16" dur="500"/>
+                                        <p:tgtEl>
+                                          <p:spTgt spid="12"/>
+                                        </p:tgtEl>
+                                      </p:cBhvr>
+                                    </p:animEffect>
+                                  </p:childTnLst>
+                                </p:cTn>
+                              </p:par>
+                            </p:childTnLst>
+                          </p:cTn>
+                        </p:par>
+                      </p:childTnLst>
+                    </p:cTn>
+                  </p:par>
+                  <p:par>
+                    <p:cTn id="17" fill="hold">
+                      <p:stCondLst>
+                        <p:cond delay="indefinite"/>
+                      </p:stCondLst>
+                      <p:childTnLst>
+                        <p:par>
+                          <p:cTn id="18" fill="hold">
+                            <p:stCondLst>
+                              <p:cond delay="0"/>
+                            </p:stCondLst>
+                            <p:childTnLst>
+                              <p:par>
+                                <p:cTn id="19" presetID="10" presetClass="exit" presetSubtype="0" fill="hold" nodeType="clickEffect">
+                                  <p:stCondLst>
+                                    <p:cond delay="0"/>
+                                  </p:stCondLst>
+                                  <p:childTnLst>
+                                    <p:animEffect transition="out" filter="fade">
+                                      <p:cBhvr>
+                                        <p:cTn id="20" dur="500"/>
+                                        <p:tgtEl>
+                                          <p:spTgt spid="12"/>
+                                        </p:tgtEl>
+                                      </p:cBhvr>
+                                    </p:animEffect>
+                                    <p:set>
+                                      <p:cBhvr>
+                                        <p:cTn id="21" dur="1" fill="hold">
+                                          <p:stCondLst>
+                                            <p:cond delay="499"/>
+                                          </p:stCondLst>
+                                        </p:cTn>
+                                        <p:tgtEl>
+                                          <p:spTgt spid="12"/>
+                                        </p:tgtEl>
+                                        <p:attrNameLst>
+                                          <p:attrName>style.visibility</p:attrName>
+                                        </p:attrNameLst>
+                                      </p:cBhvr>
+                                      <p:to>
+                                        <p:strVal val="hidden"/>
+                                      </p:to>
+                                    </p:set>
+                                  </p:childTnLst>
+                                </p:cTn>
+                              </p:par>
+                            </p:childTnLst>
+                          </p:cTn>
+                        </p:par>
+                        <p:par>
+                          <p:cTn id="22" fill="hold">
+                            <p:stCondLst>
+                              <p:cond delay="500"/>
+                            </p:stCondLst>
+                            <p:childTnLst>
+                              <p:par>
+                                <p:cTn id="23" presetID="10" presetClass="entr" presetSubtype="0" fill="hold" nodeType="afterEffect">
+                                  <p:stCondLst>
+                                    <p:cond delay="0"/>
+                                  </p:stCondLst>
+                                  <p:childTnLst>
+                                    <p:set>
+                                      <p:cBhvr>
+                                        <p:cTn id="24" dur="1" fill="hold">
+                                          <p:stCondLst>
+                                            <p:cond delay="0"/>
+                                          </p:stCondLst>
+                                        </p:cTn>
+                                        <p:tgtEl>
+                                          <p:spTgt spid="4"/>
+                                        </p:tgtEl>
+                                        <p:attrNameLst>
+                                          <p:attrName>style.visibility</p:attrName>
+                                        </p:attrNameLst>
+                                      </p:cBhvr>
+                                      <p:to>
+                                        <p:strVal val="visible"/>
+                                      </p:to>
+                                    </p:set>
+                                    <p:animEffect transition="in" filter="fade">
+                                      <p:cBhvr>
+                                        <p:cTn id="25" dur="500"/>
+                                        <p:tgtEl>
+                                          <p:spTgt spid="4"/>
+                                        </p:tgtEl>
+                                      </p:cBhvr>
+                                    </p:animEffect>
+                                  </p:childTnLst>
+                                </p:cTn>
+                              </p:par>
+                            </p:childTnLst>
+                          </p:cTn>
+                        </p:par>
+                        <p:par>
+                          <p:cTn id="26" fill="hold">
+                            <p:stCondLst>
+                              <p:cond delay="1000"/>
+                            </p:stCondLst>
+                            <p:childTnLst>
+                              <p:par>
+                                <p:cTn id="27" presetID="42" presetClass="path" presetSubtype="0" accel="50000" decel="50000" fill="hold" nodeType="afterEffect">
+                                  <p:stCondLst>
+                                    <p:cond delay="0"/>
+                                  </p:stCondLst>
+                                  <p:childTnLst>
+                                    <p:animMotion origin="layout" path="M -3.75E-6 -4.07407E-6 L -0.23515 -4.07407E-6 " pathEditMode="relative" rAng="0" ptsTypes="AA">
+                                      <p:cBhvr>
+                                        <p:cTn id="28" dur="2000" fill="hold"/>
+                                        <p:tgtEl>
+                                          <p:spTgt spid="4"/>
+                                        </p:tgtEl>
+                                        <p:attrNameLst>
+                                          <p:attrName>ppt_x</p:attrName>
+                                          <p:attrName>ppt_y</p:attrName>
+                                        </p:attrNameLst>
+                                      </p:cBhvr>
+                                      <p:rCtr x="-11758" y="0"/>
+                                    </p:animMotion>
+                                  </p:childTnLst>
+                                </p:cTn>
+                              </p:par>
+                            </p:childTnLst>
+                          </p:cTn>
+                        </p:par>
+                        <p:par>
+                          <p:cTn id="29" fill="hold">
+                            <p:stCondLst>
+                              <p:cond delay="3000"/>
+                            </p:stCondLst>
+                            <p:childTnLst>
+                              <p:par>
+                                <p:cTn id="30" presetID="10" presetClass="entr" presetSubtype="0" fill="hold" nodeType="afterEffect">
+                                  <p:stCondLst>
+                                    <p:cond delay="0"/>
+                                  </p:stCondLst>
+                                  <p:childTnLst>
+                                    <p:set>
+                                      <p:cBhvr>
+                                        <p:cTn id="31" dur="1" fill="hold">
+                                          <p:stCondLst>
+                                            <p:cond delay="0"/>
+                                          </p:stCondLst>
+                                        </p:cTn>
+                                        <p:tgtEl>
+                                          <p:spTgt spid="6"/>
+                                        </p:tgtEl>
+                                        <p:attrNameLst>
+                                          <p:attrName>style.visibility</p:attrName>
+                                        </p:attrNameLst>
+                                      </p:cBhvr>
+                                      <p:to>
+                                        <p:strVal val="visible"/>
+                                      </p:to>
+                                    </p:set>
+                                    <p:animEffect transition="in" filter="fade">
+                                      <p:cBhvr>
+                                        <p:cTn id="32" dur="500"/>
+                                        <p:tgtEl>
+                                          <p:spTgt spid="6"/>
+                                        </p:tgtEl>
+                                      </p:cBhvr>
+                                    </p:animEffect>
+                                  </p:childTnLst>
+                                </p:cTn>
+                              </p:par>
+                            </p:childTnLst>
+                          </p:cTn>
+                        </p:par>
+                      </p:childTnLst>
+                    </p:cTn>
+                  </p:par>
+                  <p:par>
+                    <p:cTn id="33" fill="hold">
+                      <p:stCondLst>
+                        <p:cond delay="indefinite"/>
+                      </p:stCondLst>
+                      <p:childTnLst>
+                        <p:par>
+                          <p:cTn id="34" fill="hold">
+                            <p:stCondLst>
+                              <p:cond delay="0"/>
+                            </p:stCondLst>
+                            <p:childTnLst>
+                              <p:par>
+                                <p:cTn id="35" presetID="42" presetClass="path" presetSubtype="0" accel="50000" decel="50000" fill="hold" nodeType="clickEffect">
+                                  <p:stCondLst>
+                                    <p:cond delay="0"/>
+                                  </p:stCondLst>
+                                  <p:childTnLst>
+                                    <p:animMotion origin="layout" path="M 4.16667E-7 4.44444E-6 L -0.175 -0.00463 " pathEditMode="relative" rAng="0" ptsTypes="AA">
+                                      <p:cBhvr>
+                                        <p:cTn id="36" dur="2000" fill="hold"/>
+                                        <p:tgtEl>
+                                          <p:spTgt spid="6"/>
+                                        </p:tgtEl>
+                                        <p:attrNameLst>
+                                          <p:attrName>ppt_x</p:attrName>
+                                          <p:attrName>ppt_y</p:attrName>
+                                        </p:attrNameLst>
+                                      </p:cBhvr>
+                                      <p:rCtr x="-8750" y="-231"/>
+                                    </p:animMotion>
+                                  </p:childTnLst>
+                                </p:cTn>
+                              </p:par>
+                              <p:par>
+                                <p:cTn id="37" presetID="42" presetClass="path" presetSubtype="0" accel="50000" decel="50000" fill="hold" nodeType="withEffect">
+                                  <p:stCondLst>
+                                    <p:cond delay="0"/>
+                                  </p:stCondLst>
+                                  <p:childTnLst>
+                                    <p:animMotion origin="layout" path="M -0.23515 -4.07407E-6 L -3.75E-6 -4.07407E-6 " pathEditMode="relative" rAng="0" ptsTypes="AA">
+                                      <p:cBhvr>
+                                        <p:cTn id="38" dur="2000" fill="hold"/>
+                                        <p:tgtEl>
+                                          <p:spTgt spid="4"/>
+                                        </p:tgtEl>
+                                        <p:attrNameLst>
+                                          <p:attrName>ppt_x</p:attrName>
+                                          <p:attrName>ppt_y</p:attrName>
+                                        </p:attrNameLst>
+                                      </p:cBhvr>
+                                      <p:rCtr x="11758" y="0"/>
+                                    </p:animMotion>
+                                  </p:childTnLst>
+                                </p:cTn>
+                              </p:par>
+                              <p:par>
+                                <p:cTn id="39" presetID="10" presetClass="exit" presetSubtype="0" fill="hold" nodeType="withEffect">
+                                  <p:stCondLst>
+                                    <p:cond delay="0"/>
+                                  </p:stCondLst>
+                                  <p:childTnLst>
+                                    <p:animEffect transition="out" filter="fade">
+                                      <p:cBhvr>
+                                        <p:cTn id="40" dur="500"/>
+                                        <p:tgtEl>
+                                          <p:spTgt spid="4"/>
+                                        </p:tgtEl>
+                                      </p:cBhvr>
+                                    </p:animEffect>
+                                    <p:set>
+                                      <p:cBhvr>
+                                        <p:cTn id="41" dur="1" fill="hold">
+                                          <p:stCondLst>
+                                            <p:cond delay="499"/>
+                                          </p:stCondLst>
+                                        </p:cTn>
+                                        <p:tgtEl>
+                                          <p:spTgt spid="4"/>
+                                        </p:tgtEl>
+                                        <p:attrNameLst>
+                                          <p:attrName>style.visibility</p:attrName>
+                                        </p:attrNameLst>
+                                      </p:cBhvr>
+                                      <p:to>
+                                        <p:strVal val="hidden"/>
+                                      </p:to>
+                                    </p:set>
+                                  </p:childTnLst>
+                                </p:cTn>
+                              </p:par>
+                              <p:par>
+                                <p:cTn id="42" presetID="10" presetClass="exit" presetSubtype="0" fill="hold" nodeType="withEffect">
+                                  <p:stCondLst>
+                                    <p:cond delay="0"/>
+                                  </p:stCondLst>
+                                  <p:childTnLst>
+                                    <p:animEffect transition="out" filter="fade">
+                                      <p:cBhvr>
+                                        <p:cTn id="43" dur="500"/>
+                                        <p:tgtEl>
+                                          <p:spTgt spid="6"/>
+                                        </p:tgtEl>
+                                      </p:cBhvr>
+                                    </p:animEffect>
+                                    <p:set>
+                                      <p:cBhvr>
+                                        <p:cTn id="44" dur="1" fill="hold">
+                                          <p:stCondLst>
+                                            <p:cond delay="499"/>
+                                          </p:stCondLst>
+                                        </p:cTn>
+                                        <p:tgtEl>
+                                          <p:spTgt spid="6"/>
+                                        </p:tgtEl>
+                                        <p:attrNameLst>
+                                          <p:attrName>style.visibility</p:attrName>
+                                        </p:attrNameLst>
+                                      </p:cBhvr>
+                                      <p:to>
+                                        <p:strVal val="hidden"/>
+                                      </p:to>
+                                    </p:set>
+                                  </p:childTnLst>
+                                </p:cTn>
+                              </p:par>
+                              <p:par>
+                                <p:cTn id="45" presetID="42" presetClass="entr" presetSubtype="0" fill="hold" nodeType="withEffect">
+                                  <p:stCondLst>
+                                    <p:cond delay="0"/>
+                                  </p:stCondLst>
+                                  <p:childTnLst>
+                                    <p:set>
+                                      <p:cBhvr>
+                                        <p:cTn id="46" dur="1" fill="hold">
+                                          <p:stCondLst>
+                                            <p:cond delay="0"/>
+                                          </p:stCondLst>
+                                        </p:cTn>
+                                        <p:tgtEl>
+                                          <p:spTgt spid="9"/>
+                                        </p:tgtEl>
+                                        <p:attrNameLst>
+                                          <p:attrName>style.visibility</p:attrName>
+                                        </p:attrNameLst>
+                                      </p:cBhvr>
+                                      <p:to>
+                                        <p:strVal val="visible"/>
+                                      </p:to>
+                                    </p:set>
+                                    <p:animEffect transition="in" filter="fade">
+                                      <p:cBhvr>
+                                        <p:cTn id="47" dur="1000"/>
+                                        <p:tgtEl>
+                                          <p:spTgt spid="9"/>
+                                        </p:tgtEl>
+                                      </p:cBhvr>
+                                    </p:animEffect>
+                                    <p:anim calcmode="lin" valueType="num">
+                                      <p:cBhvr>
+                                        <p:cTn id="48" dur="1000" fill="hold"/>
+                                        <p:tgtEl>
+                                          <p:spTgt spid="9"/>
+                                        </p:tgtEl>
+                                        <p:attrNameLst>
+                                          <p:attrName>ppt_x</p:attrName>
+                                        </p:attrNameLst>
+                                      </p:cBhvr>
+                                      <p:tavLst>
+                                        <p:tav tm="0">
+                                          <p:val>
+                                            <p:strVal val="#ppt_x"/>
+                                          </p:val>
+                                        </p:tav>
+                                        <p:tav tm="100000">
+                                          <p:val>
+                                            <p:strVal val="#ppt_x"/>
+                                          </p:val>
+                                        </p:tav>
+                                      </p:tavLst>
+                                    </p:anim>
+                                    <p:anim calcmode="lin" valueType="num">
+                                      <p:cBhvr>
+                                        <p:cTn id="49" dur="1000" fill="hold"/>
+                                        <p:tgtEl>
+                                          <p:spTgt spid="9"/>
+                                        </p:tgtEl>
+                                        <p:attrNameLst>
+                                          <p:attrName>ppt_y</p:attrName>
+                                        </p:attrNameLst>
+                                      </p:cBhvr>
+                                      <p:tavLst>
+                                        <p:tav tm="0">
+                                          <p:val>
+                                            <p:strVal val="#ppt_y+.1"/>
+                                          </p:val>
+                                        </p:tav>
+                                        <p:tav tm="100000">
+                                          <p:val>
+                                            <p:strVal val="#ppt_y"/>
+                                          </p:val>
+                                        </p:tav>
+                                      </p:tavLst>
+                                    </p:anim>
+                                  </p:childTnLst>
+                                </p:cTn>
+                              </p:par>
+                            </p:childTnLst>
+                          </p:cTn>
+                        </p:par>
+                      </p:childTnLst>
+                    </p:cTn>
+                  </p:par>
+                </p:childTnLst>
+              </p:cTn>
+              <p:prevCondLst>
+                <p:cond evt="onPrev" delay="0">
+                  <p:tgtEl>
+                    <p:sldTgt/>
+                  </p:tgtEl>
+                </p:cond>
+              </p:prevCondLst>
+              <p:nextCondLst>
+                <p:cond evt="onNext" delay="0">
+                  <p:tgtEl>
+                    <p:sldTgt/>
+                  </p:tgtEl>
+                </p:cond>
+              </p:nextCondLst>
+            </p:seq>
+          </p:childTnLst>
+        </p:cTn>
       </p:par>
     </p:tnLst>
   </p:timing>
@@ -6255,9 +6857,57 @@
           <a:chExt cx="0" cy="0"/>
         </a:xfrm>
       </p:grpSpPr>
-      <p:sp>
-        <p:nvSpPr>
-          <p:cNvPr id="2" name="Título 1"/>
+      <p:pic>
+        <p:nvPicPr>
+          <p:cNvPr id="6" name="Imagem 5"/>
+          <p:cNvPicPr>
+            <a:picLocks noChangeAspect="1"/>
+          </p:cNvPicPr>
+          <p:nvPr/>
+        </p:nvPicPr>
+        <p:blipFill>
+          <a:blip r:embed="rId2"/>
+          <a:stretch>
+            <a:fillRect/>
+          </a:stretch>
+        </p:blipFill>
+        <p:spPr>
+          <a:xfrm>
+            <a:off x="3822516" y="1691184"/>
+            <a:ext cx="5443056" cy="5166816"/>
+          </a:xfrm>
+          <a:prstGeom prst="rect">
+            <a:avLst/>
+          </a:prstGeom>
+        </p:spPr>
+      </p:pic>
+      <p:pic>
+        <p:nvPicPr>
+          <p:cNvPr id="4" name="Imagem 3"/>
+          <p:cNvPicPr>
+            <a:picLocks noChangeAspect="1"/>
+          </p:cNvPicPr>
+          <p:nvPr/>
+        </p:nvPicPr>
+        <p:blipFill>
+          <a:blip r:embed="rId3"/>
+          <a:stretch>
+            <a:fillRect/>
+          </a:stretch>
+        </p:blipFill>
+        <p:spPr>
+          <a:xfrm>
+            <a:off x="4369998" y="1995215"/>
+            <a:ext cx="4348091" cy="4459876"/>
+          </a:xfrm>
+          <a:prstGeom prst="rect">
+            <a:avLst/>
+          </a:prstGeom>
+        </p:spPr>
+      </p:pic>
+      <p:sp>
+        <p:nvSpPr>
+          <p:cNvPr id="5" name="Título 1"/>
           <p:cNvSpPr>
             <a:spLocks noGrp="1"/>
           </p:cNvSpPr>
@@ -6265,38 +6915,65 @@
             <p:ph type="title"/>
           </p:nvPr>
         </p:nvSpPr>
-        <p:spPr/>
-        <p:txBody>
-          <a:bodyPr/>
-          <a:lstStyle/>
-          <a:p>
-            <a:endParaRPr lang="en-US"/>
-          </a:p>
-        </p:txBody>
-      </p:sp>
-      <p:sp>
-        <p:nvSpPr>
-          <p:cNvPr id="3" name="Espaço Reservado para Conteúdo 2"/>
-          <p:cNvSpPr>
-            <a:spLocks noGrp="1"/>
-          </p:cNvSpPr>
-          <p:nvPr>
-            <p:ph idx="1"/>
-          </p:nvPr>
-        </p:nvSpPr>
-        <p:spPr/>
-        <p:txBody>
-          <a:bodyPr/>
-          <a:lstStyle/>
-          <a:p>
-            <a:endParaRPr lang="en-US"/>
-          </a:p>
-        </p:txBody>
-      </p:sp>
+        <p:spPr>
+          <a:xfrm>
+            <a:off x="1286245" y="365621"/>
+            <a:ext cx="10515600" cy="1325563"/>
+          </a:xfrm>
+        </p:spPr>
+        <p:txBody>
+          <a:bodyPr>
+            <a:normAutofit/>
+          </a:bodyPr>
+          <a:lstStyle/>
+          <a:p>
+            <a:pPr algn="ctr"/>
+            <a:r>
+              <a:rPr lang="pt-BR" sz="8800" dirty="0" smtClean="0">
+                <a:solidFill>
+                  <a:schemeClr val="bg1"/>
+                </a:solidFill>
+                <a:latin typeface="cafÈ &amp; brewery" pitchFamily="2" charset="0"/>
+              </a:rPr>
+              <a:t>Como funciona?</a:t>
+            </a:r>
+            <a:endParaRPr lang="en-US" sz="8800" dirty="0">
+              <a:solidFill>
+                <a:schemeClr val="bg1"/>
+              </a:solidFill>
+              <a:latin typeface="cafÈ &amp; brewery" pitchFamily="2" charset="0"/>
+            </a:endParaRPr>
+          </a:p>
+        </p:txBody>
+      </p:sp>
+      <p:pic>
+        <p:nvPicPr>
+          <p:cNvPr id="7" name="Imagem 6"/>
+          <p:cNvPicPr>
+            <a:picLocks noChangeAspect="1"/>
+          </p:cNvPicPr>
+          <p:nvPr/>
+        </p:nvPicPr>
+        <p:blipFill>
+          <a:blip r:embed="rId4"/>
+          <a:stretch>
+            <a:fillRect/>
+          </a:stretch>
+        </p:blipFill>
+        <p:spPr>
+          <a:xfrm>
+            <a:off x="4159792" y="1995215"/>
+            <a:ext cx="5105780" cy="3851813"/>
+          </a:xfrm>
+          <a:prstGeom prst="rect">
+            <a:avLst/>
+          </a:prstGeom>
+        </p:spPr>
+      </p:pic>
     </p:spTree>
     <p:extLst>
       <p:ext uri="{BB962C8B-B14F-4D97-AF65-F5344CB8AC3E}">
-        <p14:creationId xmlns:p14="http://schemas.microsoft.com/office/powerpoint/2010/main" val="1174677133"/>
+        <p14:creationId xmlns:p14="http://schemas.microsoft.com/office/powerpoint/2010/main" val="549384286"/>
       </p:ext>
     </p:extLst>
   </p:cSld>
@@ -6306,7 +6983,422 @@
   <p:timing>
     <p:tnLst>
       <p:par>
-        <p:cTn id="1" dur="indefinite" restart="never" nodeType="tmRoot"/>
+        <p:cTn id="1" dur="indefinite" restart="never" nodeType="tmRoot">
+          <p:childTnLst>
+            <p:seq concurrent="1" nextAc="seek">
+              <p:cTn id="2" dur="indefinite" nodeType="mainSeq">
+                <p:childTnLst>
+                  <p:par>
+                    <p:cTn id="3" fill="hold">
+                      <p:stCondLst>
+                        <p:cond delay="indefinite"/>
+                      </p:stCondLst>
+                      <p:childTnLst>
+                        <p:par>
+                          <p:cTn id="4" fill="hold">
+                            <p:stCondLst>
+                              <p:cond delay="0"/>
+                            </p:stCondLst>
+                            <p:childTnLst>
+                              <p:par>
+                                <p:cTn id="5" presetID="2" presetClass="entr" presetSubtype="4" fill="hold" nodeType="clickEffect">
+                                  <p:stCondLst>
+                                    <p:cond delay="0"/>
+                                  </p:stCondLst>
+                                  <p:childTnLst>
+                                    <p:set>
+                                      <p:cBhvr>
+                                        <p:cTn id="6" dur="1" fill="hold">
+                                          <p:stCondLst>
+                                            <p:cond delay="0"/>
+                                          </p:stCondLst>
+                                        </p:cTn>
+                                        <p:tgtEl>
+                                          <p:spTgt spid="6"/>
+                                        </p:tgtEl>
+                                        <p:attrNameLst>
+                                          <p:attrName>style.visibility</p:attrName>
+                                        </p:attrNameLst>
+                                      </p:cBhvr>
+                                      <p:to>
+                                        <p:strVal val="visible"/>
+                                      </p:to>
+                                    </p:set>
+                                    <p:anim calcmode="lin" valueType="num">
+                                      <p:cBhvr additive="base">
+                                        <p:cTn id="7" dur="500" fill="hold"/>
+                                        <p:tgtEl>
+                                          <p:spTgt spid="6"/>
+                                        </p:tgtEl>
+                                        <p:attrNameLst>
+                                          <p:attrName>ppt_x</p:attrName>
+                                        </p:attrNameLst>
+                                      </p:cBhvr>
+                                      <p:tavLst>
+                                        <p:tav tm="0">
+                                          <p:val>
+                                            <p:strVal val="#ppt_x"/>
+                                          </p:val>
+                                        </p:tav>
+                                        <p:tav tm="100000">
+                                          <p:val>
+                                            <p:strVal val="#ppt_x"/>
+                                          </p:val>
+                                        </p:tav>
+                                      </p:tavLst>
+                                    </p:anim>
+                                    <p:anim calcmode="lin" valueType="num">
+                                      <p:cBhvr additive="base">
+                                        <p:cTn id="8" dur="500" fill="hold"/>
+                                        <p:tgtEl>
+                                          <p:spTgt spid="6"/>
+                                        </p:tgtEl>
+                                        <p:attrNameLst>
+                                          <p:attrName>ppt_y</p:attrName>
+                                        </p:attrNameLst>
+                                      </p:cBhvr>
+                                      <p:tavLst>
+                                        <p:tav tm="0">
+                                          <p:val>
+                                            <p:strVal val="1+#ppt_h/2"/>
+                                          </p:val>
+                                        </p:tav>
+                                        <p:tav tm="100000">
+                                          <p:val>
+                                            <p:strVal val="#ppt_y"/>
+                                          </p:val>
+                                        </p:tav>
+                                      </p:tavLst>
+                                    </p:anim>
+                                  </p:childTnLst>
+                                </p:cTn>
+                              </p:par>
+                            </p:childTnLst>
+                          </p:cTn>
+                        </p:par>
+                      </p:childTnLst>
+                    </p:cTn>
+                  </p:par>
+                  <p:par>
+                    <p:cTn id="9" fill="hold">
+                      <p:stCondLst>
+                        <p:cond delay="indefinite"/>
+                      </p:stCondLst>
+                      <p:childTnLst>
+                        <p:par>
+                          <p:cTn id="10" fill="hold">
+                            <p:stCondLst>
+                              <p:cond delay="0"/>
+                            </p:stCondLst>
+                            <p:childTnLst>
+                              <p:par>
+                                <p:cTn id="11" presetID="2" presetClass="exit" presetSubtype="4" fill="hold" nodeType="clickEffect">
+                                  <p:stCondLst>
+                                    <p:cond delay="0"/>
+                                  </p:stCondLst>
+                                  <p:childTnLst>
+                                    <p:anim calcmode="lin" valueType="num">
+                                      <p:cBhvr additive="base">
+                                        <p:cTn id="12" dur="500"/>
+                                        <p:tgtEl>
+                                          <p:spTgt spid="6"/>
+                                        </p:tgtEl>
+                                        <p:attrNameLst>
+                                          <p:attrName>ppt_x</p:attrName>
+                                        </p:attrNameLst>
+                                      </p:cBhvr>
+                                      <p:tavLst>
+                                        <p:tav tm="0">
+                                          <p:val>
+                                            <p:strVal val="ppt_x"/>
+                                          </p:val>
+                                        </p:tav>
+                                        <p:tav tm="100000">
+                                          <p:val>
+                                            <p:strVal val="ppt_x"/>
+                                          </p:val>
+                                        </p:tav>
+                                      </p:tavLst>
+                                    </p:anim>
+                                    <p:anim calcmode="lin" valueType="num">
+                                      <p:cBhvr additive="base">
+                                        <p:cTn id="13" dur="500"/>
+                                        <p:tgtEl>
+                                          <p:spTgt spid="6"/>
+                                        </p:tgtEl>
+                                        <p:attrNameLst>
+                                          <p:attrName>ppt_y</p:attrName>
+                                        </p:attrNameLst>
+                                      </p:cBhvr>
+                                      <p:tavLst>
+                                        <p:tav tm="0">
+                                          <p:val>
+                                            <p:strVal val="ppt_y"/>
+                                          </p:val>
+                                        </p:tav>
+                                        <p:tav tm="100000">
+                                          <p:val>
+                                            <p:strVal val="1+ppt_h/2"/>
+                                          </p:val>
+                                        </p:tav>
+                                      </p:tavLst>
+                                    </p:anim>
+                                    <p:set>
+                                      <p:cBhvr>
+                                        <p:cTn id="14" dur="1" fill="hold">
+                                          <p:stCondLst>
+                                            <p:cond delay="499"/>
+                                          </p:stCondLst>
+                                        </p:cTn>
+                                        <p:tgtEl>
+                                          <p:spTgt spid="6"/>
+                                        </p:tgtEl>
+                                        <p:attrNameLst>
+                                          <p:attrName>style.visibility</p:attrName>
+                                        </p:attrNameLst>
+                                      </p:cBhvr>
+                                      <p:to>
+                                        <p:strVal val="hidden"/>
+                                      </p:to>
+                                    </p:set>
+                                  </p:childTnLst>
+                                </p:cTn>
+                              </p:par>
+                            </p:childTnLst>
+                          </p:cTn>
+                        </p:par>
+                        <p:par>
+                          <p:cTn id="15" fill="hold">
+                            <p:stCondLst>
+                              <p:cond delay="500"/>
+                            </p:stCondLst>
+                            <p:childTnLst>
+                              <p:par>
+                                <p:cTn id="16" presetID="10" presetClass="entr" presetSubtype="0" fill="hold" nodeType="afterEffect">
+                                  <p:stCondLst>
+                                    <p:cond delay="0"/>
+                                  </p:stCondLst>
+                                  <p:childTnLst>
+                                    <p:set>
+                                      <p:cBhvr>
+                                        <p:cTn id="17" dur="1" fill="hold">
+                                          <p:stCondLst>
+                                            <p:cond delay="0"/>
+                                          </p:stCondLst>
+                                        </p:cTn>
+                                        <p:tgtEl>
+                                          <p:spTgt spid="7"/>
+                                        </p:tgtEl>
+                                        <p:attrNameLst>
+                                          <p:attrName>style.visibility</p:attrName>
+                                        </p:attrNameLst>
+                                      </p:cBhvr>
+                                      <p:to>
+                                        <p:strVal val="visible"/>
+                                      </p:to>
+                                    </p:set>
+                                    <p:animEffect transition="in" filter="fade">
+                                      <p:cBhvr>
+                                        <p:cTn id="18" dur="500"/>
+                                        <p:tgtEl>
+                                          <p:spTgt spid="7"/>
+                                        </p:tgtEl>
+                                      </p:cBhvr>
+                                    </p:animEffect>
+                                  </p:childTnLst>
+                                </p:cTn>
+                              </p:par>
+                            </p:childTnLst>
+                          </p:cTn>
+                        </p:par>
+                      </p:childTnLst>
+                    </p:cTn>
+                  </p:par>
+                  <p:par>
+                    <p:cTn id="19" fill="hold">
+                      <p:stCondLst>
+                        <p:cond delay="indefinite"/>
+                      </p:stCondLst>
+                      <p:childTnLst>
+                        <p:par>
+                          <p:cTn id="20" fill="hold">
+                            <p:stCondLst>
+                              <p:cond delay="0"/>
+                            </p:stCondLst>
+                            <p:childTnLst>
+                              <p:par>
+                                <p:cTn id="21" presetID="10" presetClass="exit" presetSubtype="0" fill="hold" nodeType="clickEffect">
+                                  <p:stCondLst>
+                                    <p:cond delay="0"/>
+                                  </p:stCondLst>
+                                  <p:childTnLst>
+                                    <p:animEffect transition="out" filter="fade">
+                                      <p:cBhvr>
+                                        <p:cTn id="22" dur="500"/>
+                                        <p:tgtEl>
+                                          <p:spTgt spid="7"/>
+                                        </p:tgtEl>
+                                      </p:cBhvr>
+                                    </p:animEffect>
+                                    <p:set>
+                                      <p:cBhvr>
+                                        <p:cTn id="23" dur="1" fill="hold">
+                                          <p:stCondLst>
+                                            <p:cond delay="499"/>
+                                          </p:stCondLst>
+                                        </p:cTn>
+                                        <p:tgtEl>
+                                          <p:spTgt spid="7"/>
+                                        </p:tgtEl>
+                                        <p:attrNameLst>
+                                          <p:attrName>style.visibility</p:attrName>
+                                        </p:attrNameLst>
+                                      </p:cBhvr>
+                                      <p:to>
+                                        <p:strVal val="hidden"/>
+                                      </p:to>
+                                    </p:set>
+                                  </p:childTnLst>
+                                </p:cTn>
+                              </p:par>
+                            </p:childTnLst>
+                          </p:cTn>
+                        </p:par>
+                        <p:par>
+                          <p:cTn id="24" fill="hold">
+                            <p:stCondLst>
+                              <p:cond delay="500"/>
+                            </p:stCondLst>
+                            <p:childTnLst>
+                              <p:par>
+                                <p:cTn id="25" presetID="31" presetClass="entr" presetSubtype="0" fill="hold" nodeType="afterEffect">
+                                  <p:stCondLst>
+                                    <p:cond delay="0"/>
+                                  </p:stCondLst>
+                                  <p:childTnLst>
+                                    <p:set>
+                                      <p:cBhvr>
+                                        <p:cTn id="26" dur="1" fill="hold">
+                                          <p:stCondLst>
+                                            <p:cond delay="0"/>
+                                          </p:stCondLst>
+                                        </p:cTn>
+                                        <p:tgtEl>
+                                          <p:spTgt spid="4"/>
+                                        </p:tgtEl>
+                                        <p:attrNameLst>
+                                          <p:attrName>style.visibility</p:attrName>
+                                        </p:attrNameLst>
+                                      </p:cBhvr>
+                                      <p:to>
+                                        <p:strVal val="visible"/>
+                                      </p:to>
+                                    </p:set>
+                                    <p:anim calcmode="lin" valueType="num">
+                                      <p:cBhvr>
+                                        <p:cTn id="27" dur="1000" fill="hold"/>
+                                        <p:tgtEl>
+                                          <p:spTgt spid="4"/>
+                                        </p:tgtEl>
+                                        <p:attrNameLst>
+                                          <p:attrName>ppt_w</p:attrName>
+                                        </p:attrNameLst>
+                                      </p:cBhvr>
+                                      <p:tavLst>
+                                        <p:tav tm="0">
+                                          <p:val>
+                                            <p:fltVal val="0"/>
+                                          </p:val>
+                                        </p:tav>
+                                        <p:tav tm="100000">
+                                          <p:val>
+                                            <p:strVal val="#ppt_w"/>
+                                          </p:val>
+                                        </p:tav>
+                                      </p:tavLst>
+                                    </p:anim>
+                                    <p:anim calcmode="lin" valueType="num">
+                                      <p:cBhvr>
+                                        <p:cTn id="28" dur="1000" fill="hold"/>
+                                        <p:tgtEl>
+                                          <p:spTgt spid="4"/>
+                                        </p:tgtEl>
+                                        <p:attrNameLst>
+                                          <p:attrName>ppt_h</p:attrName>
+                                        </p:attrNameLst>
+                                      </p:cBhvr>
+                                      <p:tavLst>
+                                        <p:tav tm="0">
+                                          <p:val>
+                                            <p:fltVal val="0"/>
+                                          </p:val>
+                                        </p:tav>
+                                        <p:tav tm="100000">
+                                          <p:val>
+                                            <p:strVal val="#ppt_h"/>
+                                          </p:val>
+                                        </p:tav>
+                                      </p:tavLst>
+                                    </p:anim>
+                                    <p:anim calcmode="lin" valueType="num">
+                                      <p:cBhvr>
+                                        <p:cTn id="29" dur="1000" fill="hold"/>
+                                        <p:tgtEl>
+                                          <p:spTgt spid="4"/>
+                                        </p:tgtEl>
+                                        <p:attrNameLst>
+                                          <p:attrName>style.rotation</p:attrName>
+                                        </p:attrNameLst>
+                                      </p:cBhvr>
+                                      <p:tavLst>
+                                        <p:tav tm="0">
+                                          <p:val>
+                                            <p:fltVal val="90"/>
+                                          </p:val>
+                                        </p:tav>
+                                        <p:tav tm="100000">
+                                          <p:val>
+                                            <p:fltVal val="0"/>
+                                          </p:val>
+                                        </p:tav>
+                                      </p:tavLst>
+                                    </p:anim>
+                                    <p:animEffect transition="in" filter="fade">
+                                      <p:cBhvr>
+                                        <p:cTn id="30" dur="1000"/>
+                                        <p:tgtEl>
+                                          <p:spTgt spid="4"/>
+                                        </p:tgtEl>
+                                      </p:cBhvr>
+                                    </p:animEffect>
+                                  </p:childTnLst>
+                                </p:cTn>
+                              </p:par>
+                            </p:childTnLst>
+                          </p:cTn>
+                        </p:par>
+                      </p:childTnLst>
+                    </p:cTn>
+                  </p:par>
+                </p:childTnLst>
+              </p:cTn>
+              <p:prevCondLst>
+                <p:cond evt="onPrev" delay="0">
+                  <p:tgtEl>
+                    <p:sldTgt/>
+                  </p:tgtEl>
+                </p:cond>
+              </p:prevCondLst>
+              <p:nextCondLst>
+                <p:cond evt="onNext" delay="0">
+                  <p:tgtEl>
+                    <p:sldTgt/>
+                  </p:tgtEl>
+                </p:cond>
+              </p:nextCondLst>
+            </p:seq>
+          </p:childTnLst>
+        </p:cTn>
       </p:par>
     </p:tnLst>
   </p:timing>
@@ -6332,7 +7424,7 @@
       </p:grpSpPr>
       <p:sp>
         <p:nvSpPr>
-          <p:cNvPr id="2" name="Título 1"/>
+          <p:cNvPr id="4" name="Título 1"/>
           <p:cNvSpPr>
             <a:spLocks noGrp="1"/>
           </p:cNvSpPr>
@@ -6340,38 +7432,1096 @@
             <p:ph type="title"/>
           </p:nvPr>
         </p:nvSpPr>
-        <p:spPr/>
-        <p:txBody>
-          <a:bodyPr/>
-          <a:lstStyle/>
-          <a:p>
-            <a:endParaRPr lang="en-US"/>
-          </a:p>
-        </p:txBody>
-      </p:sp>
-      <p:sp>
-        <p:nvSpPr>
-          <p:cNvPr id="3" name="Espaço Reservado para Conteúdo 2"/>
-          <p:cNvSpPr>
-            <a:spLocks noGrp="1"/>
-          </p:cNvSpPr>
-          <p:nvPr>
-            <p:ph idx="1"/>
-          </p:nvPr>
-        </p:nvSpPr>
-        <p:spPr/>
-        <p:txBody>
-          <a:bodyPr/>
-          <a:lstStyle/>
-          <a:p>
-            <a:endParaRPr lang="en-US"/>
-          </a:p>
-        </p:txBody>
-      </p:sp>
+        <p:spPr>
+          <a:xfrm>
+            <a:off x="961780" y="336124"/>
+            <a:ext cx="10515600" cy="1325563"/>
+          </a:xfrm>
+        </p:spPr>
+        <p:txBody>
+          <a:bodyPr>
+            <a:normAutofit/>
+          </a:bodyPr>
+          <a:lstStyle/>
+          <a:p>
+            <a:pPr algn="ctr"/>
+            <a:r>
+              <a:rPr lang="pt-BR" sz="8800" dirty="0" smtClean="0">
+                <a:solidFill>
+                  <a:schemeClr val="bg1"/>
+                </a:solidFill>
+                <a:latin typeface="cafÈ &amp; brewery" pitchFamily="2" charset="0"/>
+              </a:rPr>
+              <a:t>Quem se beneficia?</a:t>
+            </a:r>
+            <a:endParaRPr lang="en-US" sz="8800" dirty="0">
+              <a:solidFill>
+                <a:schemeClr val="bg1"/>
+              </a:solidFill>
+              <a:latin typeface="cafÈ &amp; brewery" pitchFamily="2" charset="0"/>
+            </a:endParaRPr>
+          </a:p>
+        </p:txBody>
+      </p:sp>
+      <p:pic>
+        <p:nvPicPr>
+          <p:cNvPr id="8" name="Imagem 7"/>
+          <p:cNvPicPr>
+            <a:picLocks noChangeAspect="1"/>
+          </p:cNvPicPr>
+          <p:nvPr/>
+        </p:nvPicPr>
+        <p:blipFill>
+          <a:blip r:embed="rId2"/>
+          <a:stretch>
+            <a:fillRect/>
+          </a:stretch>
+        </p:blipFill>
+        <p:spPr>
+          <a:xfrm>
+            <a:off x="1111906" y="2392402"/>
+            <a:ext cx="3040411" cy="3139115"/>
+          </a:xfrm>
+          <a:prstGeom prst="rect">
+            <a:avLst/>
+          </a:prstGeom>
+        </p:spPr>
+      </p:pic>
+      <p:pic>
+        <p:nvPicPr>
+          <p:cNvPr id="11" name="Imagem 10"/>
+          <p:cNvPicPr>
+            <a:picLocks noChangeAspect="1"/>
+          </p:cNvPicPr>
+          <p:nvPr/>
+        </p:nvPicPr>
+        <p:blipFill>
+          <a:blip r:embed="rId3"/>
+          <a:stretch>
+            <a:fillRect/>
+          </a:stretch>
+        </p:blipFill>
+        <p:spPr>
+          <a:xfrm>
+            <a:off x="5842330" y="2643998"/>
+            <a:ext cx="4776509" cy="2635925"/>
+          </a:xfrm>
+          <a:prstGeom prst="rect">
+            <a:avLst/>
+          </a:prstGeom>
+        </p:spPr>
+      </p:pic>
+      <p:pic>
+        <p:nvPicPr>
+          <p:cNvPr id="12" name="Imagem 11"/>
+          <p:cNvPicPr>
+            <a:picLocks noChangeAspect="1"/>
+          </p:cNvPicPr>
+          <p:nvPr/>
+        </p:nvPicPr>
+        <p:blipFill>
+          <a:blip r:embed="rId4"/>
+          <a:stretch>
+            <a:fillRect/>
+          </a:stretch>
+        </p:blipFill>
+        <p:spPr>
+          <a:xfrm>
+            <a:off x="4269168" y="3412638"/>
+            <a:ext cx="1456311" cy="1098644"/>
+          </a:xfrm>
+          <a:prstGeom prst="rect">
+            <a:avLst/>
+          </a:prstGeom>
+        </p:spPr>
+      </p:pic>
+      <p:pic>
+        <p:nvPicPr>
+          <p:cNvPr id="13" name="Imagem 12"/>
+          <p:cNvPicPr>
+            <a:picLocks noChangeAspect="1"/>
+          </p:cNvPicPr>
+          <p:nvPr/>
+        </p:nvPicPr>
+        <p:blipFill>
+          <a:blip r:embed="rId4"/>
+          <a:stretch>
+            <a:fillRect/>
+          </a:stretch>
+        </p:blipFill>
+        <p:spPr>
+          <a:xfrm>
+            <a:off x="10735690" y="3412638"/>
+            <a:ext cx="1456310" cy="1098644"/>
+          </a:xfrm>
+          <a:prstGeom prst="rect">
+            <a:avLst/>
+          </a:prstGeom>
+        </p:spPr>
+      </p:pic>
     </p:spTree>
     <p:extLst>
       <p:ext uri="{BB962C8B-B14F-4D97-AF65-F5344CB8AC3E}">
-        <p14:creationId xmlns:p14="http://schemas.microsoft.com/office/powerpoint/2010/main" val="549384286"/>
+        <p14:creationId xmlns:p14="http://schemas.microsoft.com/office/powerpoint/2010/main" val="1174677133"/>
+      </p:ext>
+    </p:extLst>
+  </p:cSld>
+  <p:clrMapOvr>
+    <a:masterClrMapping/>
+  </p:clrMapOvr>
+  <p:timing>
+    <p:tnLst>
+      <p:par>
+        <p:cTn id="1" dur="indefinite" restart="never" nodeType="tmRoot">
+          <p:childTnLst>
+            <p:seq concurrent="1" nextAc="seek">
+              <p:cTn id="2" dur="indefinite" nodeType="mainSeq">
+                <p:childTnLst>
+                  <p:par>
+                    <p:cTn id="3" fill="hold">
+                      <p:stCondLst>
+                        <p:cond delay="indefinite"/>
+                      </p:stCondLst>
+                      <p:childTnLst>
+                        <p:par>
+                          <p:cTn id="4" fill="hold">
+                            <p:stCondLst>
+                              <p:cond delay="0"/>
+                            </p:stCondLst>
+                            <p:childTnLst>
+                              <p:par>
+                                <p:cTn id="5" presetID="42" presetClass="entr" presetSubtype="0" fill="hold" nodeType="clickEffect">
+                                  <p:stCondLst>
+                                    <p:cond delay="0"/>
+                                  </p:stCondLst>
+                                  <p:childTnLst>
+                                    <p:set>
+                                      <p:cBhvr>
+                                        <p:cTn id="6" dur="1" fill="hold">
+                                          <p:stCondLst>
+                                            <p:cond delay="0"/>
+                                          </p:stCondLst>
+                                        </p:cTn>
+                                        <p:tgtEl>
+                                          <p:spTgt spid="8"/>
+                                        </p:tgtEl>
+                                        <p:attrNameLst>
+                                          <p:attrName>style.visibility</p:attrName>
+                                        </p:attrNameLst>
+                                      </p:cBhvr>
+                                      <p:to>
+                                        <p:strVal val="visible"/>
+                                      </p:to>
+                                    </p:set>
+                                    <p:animEffect transition="in" filter="fade">
+                                      <p:cBhvr>
+                                        <p:cTn id="7" dur="1000"/>
+                                        <p:tgtEl>
+                                          <p:spTgt spid="8"/>
+                                        </p:tgtEl>
+                                      </p:cBhvr>
+                                    </p:animEffect>
+                                    <p:anim calcmode="lin" valueType="num">
+                                      <p:cBhvr>
+                                        <p:cTn id="8" dur="1000" fill="hold"/>
+                                        <p:tgtEl>
+                                          <p:spTgt spid="8"/>
+                                        </p:tgtEl>
+                                        <p:attrNameLst>
+                                          <p:attrName>ppt_x</p:attrName>
+                                        </p:attrNameLst>
+                                      </p:cBhvr>
+                                      <p:tavLst>
+                                        <p:tav tm="0">
+                                          <p:val>
+                                            <p:strVal val="#ppt_x"/>
+                                          </p:val>
+                                        </p:tav>
+                                        <p:tav tm="100000">
+                                          <p:val>
+                                            <p:strVal val="#ppt_x"/>
+                                          </p:val>
+                                        </p:tav>
+                                      </p:tavLst>
+                                    </p:anim>
+                                    <p:anim calcmode="lin" valueType="num">
+                                      <p:cBhvr>
+                                        <p:cTn id="9" dur="1000" fill="hold"/>
+                                        <p:tgtEl>
+                                          <p:spTgt spid="8"/>
+                                        </p:tgtEl>
+                                        <p:attrNameLst>
+                                          <p:attrName>ppt_y</p:attrName>
+                                        </p:attrNameLst>
+                                      </p:cBhvr>
+                                      <p:tavLst>
+                                        <p:tav tm="0">
+                                          <p:val>
+                                            <p:strVal val="#ppt_y+.1"/>
+                                          </p:val>
+                                        </p:tav>
+                                        <p:tav tm="100000">
+                                          <p:val>
+                                            <p:strVal val="#ppt_y"/>
+                                          </p:val>
+                                        </p:tav>
+                                      </p:tavLst>
+                                    </p:anim>
+                                  </p:childTnLst>
+                                </p:cTn>
+                              </p:par>
+                              <p:par>
+                                <p:cTn id="10" presetID="42" presetClass="entr" presetSubtype="0" fill="hold" nodeType="withEffect">
+                                  <p:stCondLst>
+                                    <p:cond delay="0"/>
+                                  </p:stCondLst>
+                                  <p:childTnLst>
+                                    <p:set>
+                                      <p:cBhvr>
+                                        <p:cTn id="11" dur="1" fill="hold">
+                                          <p:stCondLst>
+                                            <p:cond delay="0"/>
+                                          </p:stCondLst>
+                                        </p:cTn>
+                                        <p:tgtEl>
+                                          <p:spTgt spid="11"/>
+                                        </p:tgtEl>
+                                        <p:attrNameLst>
+                                          <p:attrName>style.visibility</p:attrName>
+                                        </p:attrNameLst>
+                                      </p:cBhvr>
+                                      <p:to>
+                                        <p:strVal val="visible"/>
+                                      </p:to>
+                                    </p:set>
+                                    <p:animEffect transition="in" filter="fade">
+                                      <p:cBhvr>
+                                        <p:cTn id="12" dur="1000"/>
+                                        <p:tgtEl>
+                                          <p:spTgt spid="11"/>
+                                        </p:tgtEl>
+                                      </p:cBhvr>
+                                    </p:animEffect>
+                                    <p:anim calcmode="lin" valueType="num">
+                                      <p:cBhvr>
+                                        <p:cTn id="13" dur="1000" fill="hold"/>
+                                        <p:tgtEl>
+                                          <p:spTgt spid="11"/>
+                                        </p:tgtEl>
+                                        <p:attrNameLst>
+                                          <p:attrName>ppt_x</p:attrName>
+                                        </p:attrNameLst>
+                                      </p:cBhvr>
+                                      <p:tavLst>
+                                        <p:tav tm="0">
+                                          <p:val>
+                                            <p:strVal val="#ppt_x"/>
+                                          </p:val>
+                                        </p:tav>
+                                        <p:tav tm="100000">
+                                          <p:val>
+                                            <p:strVal val="#ppt_x"/>
+                                          </p:val>
+                                        </p:tav>
+                                      </p:tavLst>
+                                    </p:anim>
+                                    <p:anim calcmode="lin" valueType="num">
+                                      <p:cBhvr>
+                                        <p:cTn id="14" dur="1000" fill="hold"/>
+                                        <p:tgtEl>
+                                          <p:spTgt spid="11"/>
+                                        </p:tgtEl>
+                                        <p:attrNameLst>
+                                          <p:attrName>ppt_y</p:attrName>
+                                        </p:attrNameLst>
+                                      </p:cBhvr>
+                                      <p:tavLst>
+                                        <p:tav tm="0">
+                                          <p:val>
+                                            <p:strVal val="#ppt_y+.1"/>
+                                          </p:val>
+                                        </p:tav>
+                                        <p:tav tm="100000">
+                                          <p:val>
+                                            <p:strVal val="#ppt_y"/>
+                                          </p:val>
+                                        </p:tav>
+                                      </p:tavLst>
+                                    </p:anim>
+                                  </p:childTnLst>
+                                </p:cTn>
+                              </p:par>
+                            </p:childTnLst>
+                          </p:cTn>
+                        </p:par>
+                      </p:childTnLst>
+                    </p:cTn>
+                  </p:par>
+                  <p:par>
+                    <p:cTn id="15" fill="hold">
+                      <p:stCondLst>
+                        <p:cond delay="indefinite"/>
+                      </p:stCondLst>
+                      <p:childTnLst>
+                        <p:par>
+                          <p:cTn id="16" fill="hold">
+                            <p:stCondLst>
+                              <p:cond delay="0"/>
+                            </p:stCondLst>
+                            <p:childTnLst>
+                              <p:par>
+                                <p:cTn id="17" presetID="25" presetClass="entr" presetSubtype="0" fill="hold" nodeType="clickEffect">
+                                  <p:stCondLst>
+                                    <p:cond delay="0"/>
+                                  </p:stCondLst>
+                                  <p:childTnLst>
+                                    <p:set>
+                                      <p:cBhvr>
+                                        <p:cTn id="18" dur="1" fill="hold">
+                                          <p:stCondLst>
+                                            <p:cond delay="0"/>
+                                          </p:stCondLst>
+                                        </p:cTn>
+                                        <p:tgtEl>
+                                          <p:spTgt spid="12"/>
+                                        </p:tgtEl>
+                                        <p:attrNameLst>
+                                          <p:attrName>style.visibility</p:attrName>
+                                        </p:attrNameLst>
+                                      </p:cBhvr>
+                                      <p:to>
+                                        <p:strVal val="visible"/>
+                                      </p:to>
+                                    </p:set>
+                                    <p:anim calcmode="lin" valueType="num">
+                                      <p:cBhvr>
+                                        <p:cTn id="19" dur="500" decel="50000" fill="hold">
+                                          <p:stCondLst>
+                                            <p:cond delay="0"/>
+                                          </p:stCondLst>
+                                        </p:cTn>
+                                        <p:tgtEl>
+                                          <p:spTgt spid="12"/>
+                                        </p:tgtEl>
+                                        <p:attrNameLst>
+                                          <p:attrName>style.rotation</p:attrName>
+                                        </p:attrNameLst>
+                                      </p:cBhvr>
+                                      <p:tavLst>
+                                        <p:tav tm="0">
+                                          <p:val>
+                                            <p:fltVal val="-90"/>
+                                          </p:val>
+                                        </p:tav>
+                                        <p:tav tm="100000">
+                                          <p:val>
+                                            <p:fltVal val="0"/>
+                                          </p:val>
+                                        </p:tav>
+                                      </p:tavLst>
+                                    </p:anim>
+                                    <p:anim calcmode="lin" valueType="num">
+                                      <p:cBhvr>
+                                        <p:cTn id="20" dur="500" decel="50000" fill="hold">
+                                          <p:stCondLst>
+                                            <p:cond delay="0"/>
+                                          </p:stCondLst>
+                                        </p:cTn>
+                                        <p:tgtEl>
+                                          <p:spTgt spid="12"/>
+                                        </p:tgtEl>
+                                        <p:attrNameLst>
+                                          <p:attrName>ppt_w</p:attrName>
+                                        </p:attrNameLst>
+                                      </p:cBhvr>
+                                      <p:tavLst>
+                                        <p:tav tm="0">
+                                          <p:val>
+                                            <p:strVal val="#ppt_w"/>
+                                          </p:val>
+                                        </p:tav>
+                                        <p:tav tm="100000">
+                                          <p:val>
+                                            <p:strVal val="#ppt_w*.05"/>
+                                          </p:val>
+                                        </p:tav>
+                                      </p:tavLst>
+                                    </p:anim>
+                                    <p:anim calcmode="lin" valueType="num">
+                                      <p:cBhvr>
+                                        <p:cTn id="21" dur="500" accel="50000" fill="hold">
+                                          <p:stCondLst>
+                                            <p:cond delay="500"/>
+                                          </p:stCondLst>
+                                        </p:cTn>
+                                        <p:tgtEl>
+                                          <p:spTgt spid="12"/>
+                                        </p:tgtEl>
+                                        <p:attrNameLst>
+                                          <p:attrName>ppt_w</p:attrName>
+                                        </p:attrNameLst>
+                                      </p:cBhvr>
+                                      <p:tavLst>
+                                        <p:tav tm="0">
+                                          <p:val>
+                                            <p:strVal val="#ppt_w*.05"/>
+                                          </p:val>
+                                        </p:tav>
+                                        <p:tav tm="100000">
+                                          <p:val>
+                                            <p:strVal val="#ppt_w"/>
+                                          </p:val>
+                                        </p:tav>
+                                      </p:tavLst>
+                                    </p:anim>
+                                    <p:anim calcmode="lin" valueType="num">
+                                      <p:cBhvr>
+                                        <p:cTn id="22" dur="1000" fill="hold"/>
+                                        <p:tgtEl>
+                                          <p:spTgt spid="12"/>
+                                        </p:tgtEl>
+                                        <p:attrNameLst>
+                                          <p:attrName>ppt_h</p:attrName>
+                                        </p:attrNameLst>
+                                      </p:cBhvr>
+                                      <p:tavLst>
+                                        <p:tav tm="0">
+                                          <p:val>
+                                            <p:strVal val="#ppt_h"/>
+                                          </p:val>
+                                        </p:tav>
+                                        <p:tav tm="100000">
+                                          <p:val>
+                                            <p:strVal val="#ppt_h"/>
+                                          </p:val>
+                                        </p:tav>
+                                      </p:tavLst>
+                                    </p:anim>
+                                    <p:anim calcmode="lin" valueType="num">
+                                      <p:cBhvr>
+                                        <p:cTn id="23" dur="500" decel="50000" fill="hold">
+                                          <p:stCondLst>
+                                            <p:cond delay="0"/>
+                                          </p:stCondLst>
+                                        </p:cTn>
+                                        <p:tgtEl>
+                                          <p:spTgt spid="12"/>
+                                        </p:tgtEl>
+                                        <p:attrNameLst>
+                                          <p:attrName>ppt_x</p:attrName>
+                                        </p:attrNameLst>
+                                      </p:cBhvr>
+                                      <p:tavLst>
+                                        <p:tav tm="0">
+                                          <p:val>
+                                            <p:strVal val="#ppt_x+.4"/>
+                                          </p:val>
+                                        </p:tav>
+                                        <p:tav tm="100000">
+                                          <p:val>
+                                            <p:strVal val="#ppt_x"/>
+                                          </p:val>
+                                        </p:tav>
+                                      </p:tavLst>
+                                    </p:anim>
+                                    <p:anim calcmode="lin" valueType="num">
+                                      <p:cBhvr>
+                                        <p:cTn id="24" dur="500" decel="50000" fill="hold">
+                                          <p:stCondLst>
+                                            <p:cond delay="0"/>
+                                          </p:stCondLst>
+                                        </p:cTn>
+                                        <p:tgtEl>
+                                          <p:spTgt spid="12"/>
+                                        </p:tgtEl>
+                                        <p:attrNameLst>
+                                          <p:attrName>ppt_y</p:attrName>
+                                        </p:attrNameLst>
+                                      </p:cBhvr>
+                                      <p:tavLst>
+                                        <p:tav tm="0">
+                                          <p:val>
+                                            <p:strVal val="#ppt_y-.2"/>
+                                          </p:val>
+                                        </p:tav>
+                                        <p:tav tm="100000">
+                                          <p:val>
+                                            <p:strVal val="#ppt_y+.1"/>
+                                          </p:val>
+                                        </p:tav>
+                                      </p:tavLst>
+                                    </p:anim>
+                                    <p:anim calcmode="lin" valueType="num">
+                                      <p:cBhvr>
+                                        <p:cTn id="25" dur="500" accel="50000" fill="hold">
+                                          <p:stCondLst>
+                                            <p:cond delay="500"/>
+                                          </p:stCondLst>
+                                        </p:cTn>
+                                        <p:tgtEl>
+                                          <p:spTgt spid="12"/>
+                                        </p:tgtEl>
+                                        <p:attrNameLst>
+                                          <p:attrName>ppt_y</p:attrName>
+                                        </p:attrNameLst>
+                                      </p:cBhvr>
+                                      <p:tavLst>
+                                        <p:tav tm="0">
+                                          <p:val>
+                                            <p:strVal val="#ppt_y+.1"/>
+                                          </p:val>
+                                        </p:tav>
+                                        <p:tav tm="100000">
+                                          <p:val>
+                                            <p:strVal val="#ppt_y"/>
+                                          </p:val>
+                                        </p:tav>
+                                      </p:tavLst>
+                                    </p:anim>
+                                    <p:animEffect transition="in" filter="fade">
+                                      <p:cBhvr>
+                                        <p:cTn id="26" dur="1000" decel="50000">
+                                          <p:stCondLst>
+                                            <p:cond delay="0"/>
+                                          </p:stCondLst>
+                                        </p:cTn>
+                                        <p:tgtEl>
+                                          <p:spTgt spid="12"/>
+                                        </p:tgtEl>
+                                      </p:cBhvr>
+                                    </p:animEffect>
+                                  </p:childTnLst>
+                                </p:cTn>
+                              </p:par>
+                            </p:childTnLst>
+                          </p:cTn>
+                        </p:par>
+                      </p:childTnLst>
+                    </p:cTn>
+                  </p:par>
+                  <p:par>
+                    <p:cTn id="27" fill="hold">
+                      <p:stCondLst>
+                        <p:cond delay="indefinite"/>
+                      </p:stCondLst>
+                      <p:childTnLst>
+                        <p:par>
+                          <p:cTn id="28" fill="hold">
+                            <p:stCondLst>
+                              <p:cond delay="0"/>
+                            </p:stCondLst>
+                            <p:childTnLst>
+                              <p:par>
+                                <p:cTn id="29" presetID="25" presetClass="entr" presetSubtype="0" fill="hold" nodeType="clickEffect">
+                                  <p:stCondLst>
+                                    <p:cond delay="0"/>
+                                  </p:stCondLst>
+                                  <p:childTnLst>
+                                    <p:set>
+                                      <p:cBhvr>
+                                        <p:cTn id="30" dur="1" fill="hold">
+                                          <p:stCondLst>
+                                            <p:cond delay="0"/>
+                                          </p:stCondLst>
+                                        </p:cTn>
+                                        <p:tgtEl>
+                                          <p:spTgt spid="13"/>
+                                        </p:tgtEl>
+                                        <p:attrNameLst>
+                                          <p:attrName>style.visibility</p:attrName>
+                                        </p:attrNameLst>
+                                      </p:cBhvr>
+                                      <p:to>
+                                        <p:strVal val="visible"/>
+                                      </p:to>
+                                    </p:set>
+                                    <p:anim calcmode="lin" valueType="num">
+                                      <p:cBhvr>
+                                        <p:cTn id="31" dur="500" decel="50000" fill="hold">
+                                          <p:stCondLst>
+                                            <p:cond delay="0"/>
+                                          </p:stCondLst>
+                                        </p:cTn>
+                                        <p:tgtEl>
+                                          <p:spTgt spid="13"/>
+                                        </p:tgtEl>
+                                        <p:attrNameLst>
+                                          <p:attrName>style.rotation</p:attrName>
+                                        </p:attrNameLst>
+                                      </p:cBhvr>
+                                      <p:tavLst>
+                                        <p:tav tm="0">
+                                          <p:val>
+                                            <p:fltVal val="-90"/>
+                                          </p:val>
+                                        </p:tav>
+                                        <p:tav tm="100000">
+                                          <p:val>
+                                            <p:fltVal val="0"/>
+                                          </p:val>
+                                        </p:tav>
+                                      </p:tavLst>
+                                    </p:anim>
+                                    <p:anim calcmode="lin" valueType="num">
+                                      <p:cBhvr>
+                                        <p:cTn id="32" dur="500" decel="50000" fill="hold">
+                                          <p:stCondLst>
+                                            <p:cond delay="0"/>
+                                          </p:stCondLst>
+                                        </p:cTn>
+                                        <p:tgtEl>
+                                          <p:spTgt spid="13"/>
+                                        </p:tgtEl>
+                                        <p:attrNameLst>
+                                          <p:attrName>ppt_w</p:attrName>
+                                        </p:attrNameLst>
+                                      </p:cBhvr>
+                                      <p:tavLst>
+                                        <p:tav tm="0">
+                                          <p:val>
+                                            <p:strVal val="#ppt_w"/>
+                                          </p:val>
+                                        </p:tav>
+                                        <p:tav tm="100000">
+                                          <p:val>
+                                            <p:strVal val="#ppt_w*.05"/>
+                                          </p:val>
+                                        </p:tav>
+                                      </p:tavLst>
+                                    </p:anim>
+                                    <p:anim calcmode="lin" valueType="num">
+                                      <p:cBhvr>
+                                        <p:cTn id="33" dur="500" accel="50000" fill="hold">
+                                          <p:stCondLst>
+                                            <p:cond delay="500"/>
+                                          </p:stCondLst>
+                                        </p:cTn>
+                                        <p:tgtEl>
+                                          <p:spTgt spid="13"/>
+                                        </p:tgtEl>
+                                        <p:attrNameLst>
+                                          <p:attrName>ppt_w</p:attrName>
+                                        </p:attrNameLst>
+                                      </p:cBhvr>
+                                      <p:tavLst>
+                                        <p:tav tm="0">
+                                          <p:val>
+                                            <p:strVal val="#ppt_w*.05"/>
+                                          </p:val>
+                                        </p:tav>
+                                        <p:tav tm="100000">
+                                          <p:val>
+                                            <p:strVal val="#ppt_w"/>
+                                          </p:val>
+                                        </p:tav>
+                                      </p:tavLst>
+                                    </p:anim>
+                                    <p:anim calcmode="lin" valueType="num">
+                                      <p:cBhvr>
+                                        <p:cTn id="34" dur="1000" fill="hold"/>
+                                        <p:tgtEl>
+                                          <p:spTgt spid="13"/>
+                                        </p:tgtEl>
+                                        <p:attrNameLst>
+                                          <p:attrName>ppt_h</p:attrName>
+                                        </p:attrNameLst>
+                                      </p:cBhvr>
+                                      <p:tavLst>
+                                        <p:tav tm="0">
+                                          <p:val>
+                                            <p:strVal val="#ppt_h"/>
+                                          </p:val>
+                                        </p:tav>
+                                        <p:tav tm="100000">
+                                          <p:val>
+                                            <p:strVal val="#ppt_h"/>
+                                          </p:val>
+                                        </p:tav>
+                                      </p:tavLst>
+                                    </p:anim>
+                                    <p:anim calcmode="lin" valueType="num">
+                                      <p:cBhvr>
+                                        <p:cTn id="35" dur="500" decel="50000" fill="hold">
+                                          <p:stCondLst>
+                                            <p:cond delay="0"/>
+                                          </p:stCondLst>
+                                        </p:cTn>
+                                        <p:tgtEl>
+                                          <p:spTgt spid="13"/>
+                                        </p:tgtEl>
+                                        <p:attrNameLst>
+                                          <p:attrName>ppt_x</p:attrName>
+                                        </p:attrNameLst>
+                                      </p:cBhvr>
+                                      <p:tavLst>
+                                        <p:tav tm="0">
+                                          <p:val>
+                                            <p:strVal val="#ppt_x+.4"/>
+                                          </p:val>
+                                        </p:tav>
+                                        <p:tav tm="100000">
+                                          <p:val>
+                                            <p:strVal val="#ppt_x"/>
+                                          </p:val>
+                                        </p:tav>
+                                      </p:tavLst>
+                                    </p:anim>
+                                    <p:anim calcmode="lin" valueType="num">
+                                      <p:cBhvr>
+                                        <p:cTn id="36" dur="500" decel="50000" fill="hold">
+                                          <p:stCondLst>
+                                            <p:cond delay="0"/>
+                                          </p:stCondLst>
+                                        </p:cTn>
+                                        <p:tgtEl>
+                                          <p:spTgt spid="13"/>
+                                        </p:tgtEl>
+                                        <p:attrNameLst>
+                                          <p:attrName>ppt_y</p:attrName>
+                                        </p:attrNameLst>
+                                      </p:cBhvr>
+                                      <p:tavLst>
+                                        <p:tav tm="0">
+                                          <p:val>
+                                            <p:strVal val="#ppt_y-.2"/>
+                                          </p:val>
+                                        </p:tav>
+                                        <p:tav tm="100000">
+                                          <p:val>
+                                            <p:strVal val="#ppt_y+.1"/>
+                                          </p:val>
+                                        </p:tav>
+                                      </p:tavLst>
+                                    </p:anim>
+                                    <p:anim calcmode="lin" valueType="num">
+                                      <p:cBhvr>
+                                        <p:cTn id="37" dur="500" accel="50000" fill="hold">
+                                          <p:stCondLst>
+                                            <p:cond delay="500"/>
+                                          </p:stCondLst>
+                                        </p:cTn>
+                                        <p:tgtEl>
+                                          <p:spTgt spid="13"/>
+                                        </p:tgtEl>
+                                        <p:attrNameLst>
+                                          <p:attrName>ppt_y</p:attrName>
+                                        </p:attrNameLst>
+                                      </p:cBhvr>
+                                      <p:tavLst>
+                                        <p:tav tm="0">
+                                          <p:val>
+                                            <p:strVal val="#ppt_y+.1"/>
+                                          </p:val>
+                                        </p:tav>
+                                        <p:tav tm="100000">
+                                          <p:val>
+                                            <p:strVal val="#ppt_y"/>
+                                          </p:val>
+                                        </p:tav>
+                                      </p:tavLst>
+                                    </p:anim>
+                                    <p:animEffect transition="in" filter="fade">
+                                      <p:cBhvr>
+                                        <p:cTn id="38" dur="1000" decel="50000">
+                                          <p:stCondLst>
+                                            <p:cond delay="0"/>
+                                          </p:stCondLst>
+                                        </p:cTn>
+                                        <p:tgtEl>
+                                          <p:spTgt spid="13"/>
+                                        </p:tgtEl>
+                                      </p:cBhvr>
+                                    </p:animEffect>
+                                  </p:childTnLst>
+                                </p:cTn>
+                              </p:par>
+                            </p:childTnLst>
+                          </p:cTn>
+                        </p:par>
+                      </p:childTnLst>
+                    </p:cTn>
+                  </p:par>
+                </p:childTnLst>
+              </p:cTn>
+              <p:prevCondLst>
+                <p:cond evt="onPrev" delay="0">
+                  <p:tgtEl>
+                    <p:sldTgt/>
+                  </p:tgtEl>
+                </p:cond>
+              </p:prevCondLst>
+              <p:nextCondLst>
+                <p:cond evt="onNext" delay="0">
+                  <p:tgtEl>
+                    <p:sldTgt/>
+                  </p:tgtEl>
+                </p:cond>
+              </p:nextCondLst>
+            </p:seq>
+          </p:childTnLst>
+        </p:cTn>
+      </p:par>
+    </p:tnLst>
+  </p:timing>
+</p:sld>
+</file>
+
+<file path=ppt/slides/slide6.xml><?xml version="1.0" encoding="utf-8"?>
+<p:sld xmlns:a="http://schemas.openxmlformats.org/drawingml/2006/main" xmlns:r="http://schemas.openxmlformats.org/officeDocument/2006/relationships" xmlns:p="http://schemas.openxmlformats.org/presentationml/2006/main">
+  <p:cSld>
+    <p:spTree>
+      <p:nvGrpSpPr>
+        <p:cNvPr id="1" name=""/>
+        <p:cNvGrpSpPr/>
+        <p:nvPr/>
+      </p:nvGrpSpPr>
+      <p:grpSpPr>
+        <a:xfrm>
+          <a:off x="0" y="0"/>
+          <a:ext cx="0" cy="0"/>
+          <a:chOff x="0" y="0"/>
+          <a:chExt cx="0" cy="0"/>
+        </a:xfrm>
+      </p:grpSpPr>
+      <p:sp>
+        <p:nvSpPr>
+          <p:cNvPr id="4" name="Título 1"/>
+          <p:cNvSpPr>
+            <a:spLocks noGrp="1"/>
+          </p:cNvSpPr>
+          <p:nvPr>
+            <p:ph type="title"/>
+          </p:nvPr>
+        </p:nvSpPr>
+        <p:spPr>
+          <a:xfrm>
+            <a:off x="838200" y="500062"/>
+            <a:ext cx="10515600" cy="1325563"/>
+          </a:xfrm>
+        </p:spPr>
+        <p:txBody>
+          <a:bodyPr>
+            <a:normAutofit/>
+          </a:bodyPr>
+          <a:lstStyle/>
+          <a:p>
+            <a:pPr algn="ctr"/>
+            <a:r>
+              <a:rPr lang="pt-BR" sz="8800" dirty="0" smtClean="0">
+                <a:solidFill>
+                  <a:schemeClr val="bg1"/>
+                </a:solidFill>
+                <a:latin typeface="cafÈ &amp; brewery" pitchFamily="2" charset="0"/>
+              </a:rPr>
+              <a:t>Riscos</a:t>
+            </a:r>
+            <a:endParaRPr lang="en-US" sz="8800" dirty="0">
+              <a:solidFill>
+                <a:schemeClr val="bg1"/>
+              </a:solidFill>
+              <a:latin typeface="cafÈ &amp; brewery" pitchFamily="2" charset="0"/>
+            </a:endParaRPr>
+          </a:p>
+        </p:txBody>
+      </p:sp>
+    </p:spTree>
+    <p:extLst>
+      <p:ext uri="{BB962C8B-B14F-4D97-AF65-F5344CB8AC3E}">
+        <p14:creationId xmlns:p14="http://schemas.microsoft.com/office/powerpoint/2010/main" val="800117128"/>
+      </p:ext>
+    </p:extLst>
+  </p:cSld>
+  <p:clrMapOvr>
+    <a:masterClrMapping/>
+  </p:clrMapOvr>
+  <p:timing>
+    <p:tnLst>
+      <p:par>
+        <p:cTn id="1" dur="indefinite" restart="never" nodeType="tmRoot"/>
+      </p:par>
+    </p:tnLst>
+  </p:timing>
+</p:sld>
+</file>
+
+<file path=ppt/slides/slide7.xml><?xml version="1.0" encoding="utf-8"?>
+<p:sld xmlns:a="http://schemas.openxmlformats.org/drawingml/2006/main" xmlns:r="http://schemas.openxmlformats.org/officeDocument/2006/relationships" xmlns:p="http://schemas.openxmlformats.org/presentationml/2006/main">
+  <p:cSld>
+    <p:spTree>
+      <p:nvGrpSpPr>
+        <p:cNvPr id="1" name=""/>
+        <p:cNvGrpSpPr/>
+        <p:nvPr/>
+      </p:nvGrpSpPr>
+      <p:grpSpPr>
+        <a:xfrm>
+          <a:off x="0" y="0"/>
+          <a:ext cx="0" cy="0"/>
+          <a:chOff x="0" y="0"/>
+          <a:chExt cx="0" cy="0"/>
+        </a:xfrm>
+      </p:grpSpPr>
+      <p:sp>
+        <p:nvSpPr>
+          <p:cNvPr id="3" name="Espaço Reservado para Conteúdo 2"/>
+          <p:cNvSpPr>
+            <a:spLocks noGrp="1"/>
+          </p:cNvSpPr>
+          <p:nvPr>
+            <p:ph idx="1"/>
+          </p:nvPr>
+        </p:nvSpPr>
+        <p:spPr/>
+        <p:txBody>
+          <a:bodyPr/>
+          <a:lstStyle/>
+          <a:p>
+            <a:endParaRPr lang="en-US"/>
+          </a:p>
+        </p:txBody>
+      </p:sp>
+      <p:sp>
+        <p:nvSpPr>
+          <p:cNvPr id="4" name="Título 1"/>
+          <p:cNvSpPr>
+            <a:spLocks noGrp="1"/>
+          </p:cNvSpPr>
+          <p:nvPr>
+            <p:ph type="title"/>
+          </p:nvPr>
+        </p:nvSpPr>
+        <p:spPr>
+          <a:xfrm>
+            <a:off x="838200" y="500062"/>
+            <a:ext cx="10515600" cy="1325563"/>
+          </a:xfrm>
+        </p:spPr>
+        <p:txBody>
+          <a:bodyPr>
+            <a:normAutofit/>
+          </a:bodyPr>
+          <a:lstStyle/>
+          <a:p>
+            <a:pPr algn="ctr"/>
+            <a:r>
+              <a:rPr lang="pt-BR" sz="8800" dirty="0" smtClean="0">
+                <a:solidFill>
+                  <a:schemeClr val="bg1"/>
+                </a:solidFill>
+                <a:latin typeface="cafÈ &amp; brewery" pitchFamily="2" charset="0"/>
+              </a:rPr>
+              <a:t>Monetização</a:t>
+            </a:r>
+            <a:endParaRPr lang="en-US" sz="8800" dirty="0">
+              <a:solidFill>
+                <a:schemeClr val="bg1"/>
+              </a:solidFill>
+              <a:latin typeface="cafÈ &amp; brewery" pitchFamily="2" charset="0"/>
+            </a:endParaRPr>
+          </a:p>
+        </p:txBody>
+      </p:sp>
+    </p:spTree>
+    <p:extLst>
+      <p:ext uri="{BB962C8B-B14F-4D97-AF65-F5344CB8AC3E}">
+        <p14:creationId xmlns:p14="http://schemas.microsoft.com/office/powerpoint/2010/main" val="1901008858"/>
+      </p:ext>
+    </p:extLst>
+  </p:cSld>
+  <p:clrMapOvr>
+    <a:masterClrMapping/>
+  </p:clrMapOvr>
+  <p:timing>
+    <p:tnLst>
+      <p:par>
+        <p:cTn id="1" dur="indefinite" restart="never" nodeType="tmRoot"/>
+      </p:par>
+    </p:tnLst>
+  </p:timing>
+</p:sld>
+</file>
+
+<file path=ppt/slides/slide8.xml><?xml version="1.0" encoding="utf-8"?>
+<p:sld xmlns:a="http://schemas.openxmlformats.org/drawingml/2006/main" xmlns:r="http://schemas.openxmlformats.org/officeDocument/2006/relationships" xmlns:p="http://schemas.openxmlformats.org/presentationml/2006/main">
+  <p:cSld>
+    <p:spTree>
+      <p:nvGrpSpPr>
+        <p:cNvPr id="1" name=""/>
+        <p:cNvGrpSpPr/>
+        <p:nvPr/>
+      </p:nvGrpSpPr>
+      <p:grpSpPr>
+        <a:xfrm>
+          <a:off x="0" y="0"/>
+          <a:ext cx="0" cy="0"/>
+          <a:chOff x="0" y="0"/>
+          <a:chExt cx="0" cy="0"/>
+        </a:xfrm>
+      </p:grpSpPr>
+      <p:sp>
+        <p:nvSpPr>
+          <p:cNvPr id="3" name="Espaço Reservado para Conteúdo 2"/>
+          <p:cNvSpPr>
+            <a:spLocks noGrp="1"/>
+          </p:cNvSpPr>
+          <p:nvPr>
+            <p:ph idx="1"/>
+          </p:nvPr>
+        </p:nvSpPr>
+        <p:spPr/>
+        <p:txBody>
+          <a:bodyPr/>
+          <a:lstStyle/>
+          <a:p>
+            <a:endParaRPr lang="en-US"/>
+          </a:p>
+        </p:txBody>
+      </p:sp>
+      <p:sp>
+        <p:nvSpPr>
+          <p:cNvPr id="4" name="Título 1"/>
+          <p:cNvSpPr>
+            <a:spLocks noGrp="1"/>
+          </p:cNvSpPr>
+          <p:nvPr>
+            <p:ph type="title"/>
+          </p:nvPr>
+        </p:nvSpPr>
+        <p:spPr>
+          <a:xfrm>
+            <a:off x="838200" y="500062"/>
+            <a:ext cx="10515600" cy="1325563"/>
+          </a:xfrm>
+        </p:spPr>
+        <p:txBody>
+          <a:bodyPr>
+            <a:normAutofit/>
+          </a:bodyPr>
+          <a:lstStyle/>
+          <a:p>
+            <a:pPr algn="ctr"/>
+            <a:r>
+              <a:rPr lang="pt-BR" sz="8800" dirty="0" smtClean="0">
+                <a:solidFill>
+                  <a:schemeClr val="bg1"/>
+                </a:solidFill>
+                <a:latin typeface="cafÈ &amp; brewery" pitchFamily="2" charset="0"/>
+              </a:rPr>
+              <a:t>Vamos ver na prática</a:t>
+            </a:r>
+            <a:endParaRPr lang="en-US" sz="8800" dirty="0">
+              <a:solidFill>
+                <a:schemeClr val="bg1"/>
+              </a:solidFill>
+              <a:latin typeface="cafÈ &amp; brewery" pitchFamily="2" charset="0"/>
+            </a:endParaRPr>
+          </a:p>
+        </p:txBody>
+      </p:sp>
+    </p:spTree>
+    <p:extLst>
+      <p:ext uri="{BB962C8B-B14F-4D97-AF65-F5344CB8AC3E}">
+        <p14:creationId xmlns:p14="http://schemas.microsoft.com/office/powerpoint/2010/main" val="4150923070"/>
       </p:ext>
     </p:extLst>
   </p:cSld>

</xml_diff>

<commit_message>
Finalizando a apresentacao e criando a apresentacao em pdf
</commit_message>
<xml_diff>
--- a/ppt/TopBeer.pptx
+++ b/ppt/TopBeer.pptx
@@ -121,6 +121,10 @@
 </p:presentation>
 </file>
 
+<file path=ppt/revisionInfo.xml><?xml version="1.0" encoding="utf-8"?>
+<p1510:revInfo xmlns:a="http://schemas.openxmlformats.org/drawingml/2006/main" xmlns:r="http://schemas.openxmlformats.org/officeDocument/2006/relationships" xmlns:p1510="http://schemas.microsoft.com/office/powerpoint/2015/10/main"/>
+</file>
+
 <file path=ppt/slideLayouts/slideLayout1.xml><?xml version="1.0" encoding="utf-8"?>
 <p:sldLayout xmlns:a="http://schemas.openxmlformats.org/drawingml/2006/main" xmlns:r="http://schemas.openxmlformats.org/officeDocument/2006/relationships" xmlns:p="http://schemas.openxmlformats.org/presentationml/2006/main" type="title" preserve="1">
   <p:cSld name="Slide de Título">
@@ -163,7 +167,7 @@
           </a:lstStyle>
           <a:p>
             <a:r>
-              <a:rPr lang="pt-BR" smtClean="0"/>
+              <a:rPr lang="pt-BR"/>
               <a:t>Clique para editar o título mestre</a:t>
             </a:r>
             <a:endParaRPr lang="en-US"/>
@@ -228,7 +232,7 @@
           </a:lstStyle>
           <a:p>
             <a:r>
-              <a:rPr lang="pt-BR" smtClean="0"/>
+              <a:rPr lang="pt-BR"/>
               <a:t>Clique para editar o estilo do subtítulo Mestre</a:t>
             </a:r>
             <a:endParaRPr lang="en-US"/>
@@ -252,7 +256,7 @@
           <a:p>
             <a:fld id="{7F232AAC-8AA4-4327-964B-53827A1879F3}" type="datetimeFigureOut">
               <a:rPr lang="en-US" smtClean="0"/>
-              <a:t>06-Aug-17</a:t>
+              <a:t>8/6/2017</a:t>
             </a:fld>
             <a:endParaRPr lang="en-US"/>
           </a:p>
@@ -346,7 +350,7 @@
           <a:lstStyle/>
           <a:p>
             <a:r>
-              <a:rPr lang="pt-BR" smtClean="0"/>
+              <a:rPr lang="pt-BR"/>
               <a:t>Clique para editar o título mestre</a:t>
             </a:r>
             <a:endParaRPr lang="en-US"/>
@@ -370,35 +374,35 @@
           <a:p>
             <a:pPr lvl="0"/>
             <a:r>
-              <a:rPr lang="pt-BR" smtClean="0"/>
+              <a:rPr lang="pt-BR"/>
               <a:t>Editar estilos de texto Mestre</a:t>
             </a:r>
           </a:p>
           <a:p>
             <a:pPr lvl="1"/>
             <a:r>
-              <a:rPr lang="pt-BR" smtClean="0"/>
+              <a:rPr lang="pt-BR"/>
               <a:t>Segundo nível</a:t>
             </a:r>
           </a:p>
           <a:p>
             <a:pPr lvl="2"/>
             <a:r>
-              <a:rPr lang="pt-BR" smtClean="0"/>
+              <a:rPr lang="pt-BR"/>
               <a:t>Terceiro nível</a:t>
             </a:r>
           </a:p>
           <a:p>
             <a:pPr lvl="3"/>
             <a:r>
-              <a:rPr lang="pt-BR" smtClean="0"/>
+              <a:rPr lang="pt-BR"/>
               <a:t>Quarto nível</a:t>
             </a:r>
           </a:p>
           <a:p>
             <a:pPr lvl="4"/>
             <a:r>
-              <a:rPr lang="pt-BR" smtClean="0"/>
+              <a:rPr lang="pt-BR"/>
               <a:t>Quinto nível</a:t>
             </a:r>
             <a:endParaRPr lang="en-US"/>
@@ -422,7 +426,7 @@
           <a:p>
             <a:fld id="{7F232AAC-8AA4-4327-964B-53827A1879F3}" type="datetimeFigureOut">
               <a:rPr lang="en-US" smtClean="0"/>
-              <a:t>06-Aug-17</a:t>
+              <a:t>8/6/2017</a:t>
             </a:fld>
             <a:endParaRPr lang="en-US"/>
           </a:p>
@@ -521,7 +525,7 @@
           <a:lstStyle/>
           <a:p>
             <a:r>
-              <a:rPr lang="pt-BR" smtClean="0"/>
+              <a:rPr lang="pt-BR"/>
               <a:t>Clique para editar o título mestre</a:t>
             </a:r>
             <a:endParaRPr lang="en-US"/>
@@ -550,35 +554,35 @@
           <a:p>
             <a:pPr lvl="0"/>
             <a:r>
-              <a:rPr lang="pt-BR" smtClean="0"/>
+              <a:rPr lang="pt-BR"/>
               <a:t>Editar estilos de texto Mestre</a:t>
             </a:r>
           </a:p>
           <a:p>
             <a:pPr lvl="1"/>
             <a:r>
-              <a:rPr lang="pt-BR" smtClean="0"/>
+              <a:rPr lang="pt-BR"/>
               <a:t>Segundo nível</a:t>
             </a:r>
           </a:p>
           <a:p>
             <a:pPr lvl="2"/>
             <a:r>
-              <a:rPr lang="pt-BR" smtClean="0"/>
+              <a:rPr lang="pt-BR"/>
               <a:t>Terceiro nível</a:t>
             </a:r>
           </a:p>
           <a:p>
             <a:pPr lvl="3"/>
             <a:r>
-              <a:rPr lang="pt-BR" smtClean="0"/>
+              <a:rPr lang="pt-BR"/>
               <a:t>Quarto nível</a:t>
             </a:r>
           </a:p>
           <a:p>
             <a:pPr lvl="4"/>
             <a:r>
-              <a:rPr lang="pt-BR" smtClean="0"/>
+              <a:rPr lang="pt-BR"/>
               <a:t>Quinto nível</a:t>
             </a:r>
             <a:endParaRPr lang="en-US"/>
@@ -602,7 +606,7 @@
           <a:p>
             <a:fld id="{7F232AAC-8AA4-4327-964B-53827A1879F3}" type="datetimeFigureOut">
               <a:rPr lang="en-US" smtClean="0"/>
-              <a:t>06-Aug-17</a:t>
+              <a:t>8/6/2017</a:t>
             </a:fld>
             <a:endParaRPr lang="en-US"/>
           </a:p>
@@ -705,7 +709,7 @@
           </a:lstStyle>
           <a:p>
             <a:r>
-              <a:rPr lang="pt-BR" smtClean="0"/>
+              <a:rPr lang="pt-BR"/>
               <a:t>Clique para editar o título mestre</a:t>
             </a:r>
             <a:endParaRPr lang="en-US"/>
@@ -770,7 +774,7 @@
           </a:lstStyle>
           <a:p>
             <a:r>
-              <a:rPr lang="pt-BR" smtClean="0"/>
+              <a:rPr lang="pt-BR"/>
               <a:t>Clique para editar o estilo do subtítulo Mestre</a:t>
             </a:r>
             <a:endParaRPr lang="en-US"/>
@@ -794,7 +798,7 @@
           <a:p>
             <a:fld id="{EC8C714D-B1CE-464B-BA2D-457A1AE0EA95}" type="datetimeFigureOut">
               <a:rPr lang="en-US" smtClean="0"/>
-              <a:t>06-Aug-17</a:t>
+              <a:t>8/6/2017</a:t>
             </a:fld>
             <a:endParaRPr lang="en-US"/>
           </a:p>
@@ -888,7 +892,7 @@
           <a:lstStyle/>
           <a:p>
             <a:r>
-              <a:rPr lang="pt-BR" smtClean="0"/>
+              <a:rPr lang="pt-BR"/>
               <a:t>Clique para editar o título mestre</a:t>
             </a:r>
             <a:endParaRPr lang="en-US"/>
@@ -912,35 +916,35 @@
           <a:p>
             <a:pPr lvl="0"/>
             <a:r>
-              <a:rPr lang="pt-BR" smtClean="0"/>
+              <a:rPr lang="pt-BR"/>
               <a:t>Editar estilos de texto Mestre</a:t>
             </a:r>
           </a:p>
           <a:p>
             <a:pPr lvl="1"/>
             <a:r>
-              <a:rPr lang="pt-BR" smtClean="0"/>
+              <a:rPr lang="pt-BR"/>
               <a:t>Segundo nível</a:t>
             </a:r>
           </a:p>
           <a:p>
             <a:pPr lvl="2"/>
             <a:r>
-              <a:rPr lang="pt-BR" smtClean="0"/>
+              <a:rPr lang="pt-BR"/>
               <a:t>Terceiro nível</a:t>
             </a:r>
           </a:p>
           <a:p>
             <a:pPr lvl="3"/>
             <a:r>
-              <a:rPr lang="pt-BR" smtClean="0"/>
+              <a:rPr lang="pt-BR"/>
               <a:t>Quarto nível</a:t>
             </a:r>
           </a:p>
           <a:p>
             <a:pPr lvl="4"/>
             <a:r>
-              <a:rPr lang="pt-BR" smtClean="0"/>
+              <a:rPr lang="pt-BR"/>
               <a:t>Quinto nível</a:t>
             </a:r>
             <a:endParaRPr lang="en-US"/>
@@ -964,7 +968,7 @@
           <a:p>
             <a:fld id="{EC8C714D-B1CE-464B-BA2D-457A1AE0EA95}" type="datetimeFigureOut">
               <a:rPr lang="en-US" smtClean="0"/>
-              <a:t>06-Aug-17</a:t>
+              <a:t>8/6/2017</a:t>
             </a:fld>
             <a:endParaRPr lang="en-US"/>
           </a:p>
@@ -1067,7 +1071,7 @@
           </a:lstStyle>
           <a:p>
             <a:r>
-              <a:rPr lang="pt-BR" smtClean="0"/>
+              <a:rPr lang="pt-BR"/>
               <a:t>Clique para editar o título mestre</a:t>
             </a:r>
             <a:endParaRPr lang="en-US"/>
@@ -1187,7 +1191,7 @@
           <a:p>
             <a:pPr lvl="0"/>
             <a:r>
-              <a:rPr lang="pt-BR" smtClean="0"/>
+              <a:rPr lang="pt-BR"/>
               <a:t>Editar estilos de texto Mestre</a:t>
             </a:r>
           </a:p>
@@ -1210,7 +1214,7 @@
           <a:p>
             <a:fld id="{EC8C714D-B1CE-464B-BA2D-457A1AE0EA95}" type="datetimeFigureOut">
               <a:rPr lang="en-US" smtClean="0"/>
-              <a:t>06-Aug-17</a:t>
+              <a:t>8/6/2017</a:t>
             </a:fld>
             <a:endParaRPr lang="en-US"/>
           </a:p>
@@ -1304,7 +1308,7 @@
           <a:lstStyle/>
           <a:p>
             <a:r>
-              <a:rPr lang="pt-BR" smtClean="0"/>
+              <a:rPr lang="pt-BR"/>
               <a:t>Clique para editar o título mestre</a:t>
             </a:r>
             <a:endParaRPr lang="en-US"/>
@@ -1333,35 +1337,35 @@
           <a:p>
             <a:pPr lvl="0"/>
             <a:r>
-              <a:rPr lang="pt-BR" smtClean="0"/>
+              <a:rPr lang="pt-BR"/>
               <a:t>Editar estilos de texto Mestre</a:t>
             </a:r>
           </a:p>
           <a:p>
             <a:pPr lvl="1"/>
             <a:r>
-              <a:rPr lang="pt-BR" smtClean="0"/>
+              <a:rPr lang="pt-BR"/>
               <a:t>Segundo nível</a:t>
             </a:r>
           </a:p>
           <a:p>
             <a:pPr lvl="2"/>
             <a:r>
-              <a:rPr lang="pt-BR" smtClean="0"/>
+              <a:rPr lang="pt-BR"/>
               <a:t>Terceiro nível</a:t>
             </a:r>
           </a:p>
           <a:p>
             <a:pPr lvl="3"/>
             <a:r>
-              <a:rPr lang="pt-BR" smtClean="0"/>
+              <a:rPr lang="pt-BR"/>
               <a:t>Quarto nível</a:t>
             </a:r>
           </a:p>
           <a:p>
             <a:pPr lvl="4"/>
             <a:r>
-              <a:rPr lang="pt-BR" smtClean="0"/>
+              <a:rPr lang="pt-BR"/>
               <a:t>Quinto nível</a:t>
             </a:r>
             <a:endParaRPr lang="en-US"/>
@@ -1390,35 +1394,35 @@
           <a:p>
             <a:pPr lvl="0"/>
             <a:r>
-              <a:rPr lang="pt-BR" smtClean="0"/>
+              <a:rPr lang="pt-BR"/>
               <a:t>Editar estilos de texto Mestre</a:t>
             </a:r>
           </a:p>
           <a:p>
             <a:pPr lvl="1"/>
             <a:r>
-              <a:rPr lang="pt-BR" smtClean="0"/>
+              <a:rPr lang="pt-BR"/>
               <a:t>Segundo nível</a:t>
             </a:r>
           </a:p>
           <a:p>
             <a:pPr lvl="2"/>
             <a:r>
-              <a:rPr lang="pt-BR" smtClean="0"/>
+              <a:rPr lang="pt-BR"/>
               <a:t>Terceiro nível</a:t>
             </a:r>
           </a:p>
           <a:p>
             <a:pPr lvl="3"/>
             <a:r>
-              <a:rPr lang="pt-BR" smtClean="0"/>
+              <a:rPr lang="pt-BR"/>
               <a:t>Quarto nível</a:t>
             </a:r>
           </a:p>
           <a:p>
             <a:pPr lvl="4"/>
             <a:r>
-              <a:rPr lang="pt-BR" smtClean="0"/>
+              <a:rPr lang="pt-BR"/>
               <a:t>Quinto nível</a:t>
             </a:r>
             <a:endParaRPr lang="en-US"/>
@@ -1442,7 +1446,7 @@
           <a:p>
             <a:fld id="{EC8C714D-B1CE-464B-BA2D-457A1AE0EA95}" type="datetimeFigureOut">
               <a:rPr lang="en-US" smtClean="0"/>
-              <a:t>06-Aug-17</a:t>
+              <a:t>8/6/2017</a:t>
             </a:fld>
             <a:endParaRPr lang="en-US"/>
           </a:p>
@@ -1541,7 +1545,7 @@
           <a:lstStyle/>
           <a:p>
             <a:r>
-              <a:rPr lang="pt-BR" smtClean="0"/>
+              <a:rPr lang="pt-BR"/>
               <a:t>Clique para editar o título mestre</a:t>
             </a:r>
             <a:endParaRPr lang="en-US"/>
@@ -1607,7 +1611,7 @@
           <a:p>
             <a:pPr lvl="0"/>
             <a:r>
-              <a:rPr lang="pt-BR" smtClean="0"/>
+              <a:rPr lang="pt-BR"/>
               <a:t>Editar estilos de texto Mestre</a:t>
             </a:r>
           </a:p>
@@ -1635,35 +1639,35 @@
           <a:p>
             <a:pPr lvl="0"/>
             <a:r>
-              <a:rPr lang="pt-BR" smtClean="0"/>
+              <a:rPr lang="pt-BR"/>
               <a:t>Editar estilos de texto Mestre</a:t>
             </a:r>
           </a:p>
           <a:p>
             <a:pPr lvl="1"/>
             <a:r>
-              <a:rPr lang="pt-BR" smtClean="0"/>
+              <a:rPr lang="pt-BR"/>
               <a:t>Segundo nível</a:t>
             </a:r>
           </a:p>
           <a:p>
             <a:pPr lvl="2"/>
             <a:r>
-              <a:rPr lang="pt-BR" smtClean="0"/>
+              <a:rPr lang="pt-BR"/>
               <a:t>Terceiro nível</a:t>
             </a:r>
           </a:p>
           <a:p>
             <a:pPr lvl="3"/>
             <a:r>
-              <a:rPr lang="pt-BR" smtClean="0"/>
+              <a:rPr lang="pt-BR"/>
               <a:t>Quarto nível</a:t>
             </a:r>
           </a:p>
           <a:p>
             <a:pPr lvl="4"/>
             <a:r>
-              <a:rPr lang="pt-BR" smtClean="0"/>
+              <a:rPr lang="pt-BR"/>
               <a:t>Quinto nível</a:t>
             </a:r>
             <a:endParaRPr lang="en-US"/>
@@ -1729,7 +1733,7 @@
           <a:p>
             <a:pPr lvl="0"/>
             <a:r>
-              <a:rPr lang="pt-BR" smtClean="0"/>
+              <a:rPr lang="pt-BR"/>
               <a:t>Editar estilos de texto Mestre</a:t>
             </a:r>
           </a:p>
@@ -1757,35 +1761,35 @@
           <a:p>
             <a:pPr lvl="0"/>
             <a:r>
-              <a:rPr lang="pt-BR" smtClean="0"/>
+              <a:rPr lang="pt-BR"/>
               <a:t>Editar estilos de texto Mestre</a:t>
             </a:r>
           </a:p>
           <a:p>
             <a:pPr lvl="1"/>
             <a:r>
-              <a:rPr lang="pt-BR" smtClean="0"/>
+              <a:rPr lang="pt-BR"/>
               <a:t>Segundo nível</a:t>
             </a:r>
           </a:p>
           <a:p>
             <a:pPr lvl="2"/>
             <a:r>
-              <a:rPr lang="pt-BR" smtClean="0"/>
+              <a:rPr lang="pt-BR"/>
               <a:t>Terceiro nível</a:t>
             </a:r>
           </a:p>
           <a:p>
             <a:pPr lvl="3"/>
             <a:r>
-              <a:rPr lang="pt-BR" smtClean="0"/>
+              <a:rPr lang="pt-BR"/>
               <a:t>Quarto nível</a:t>
             </a:r>
           </a:p>
           <a:p>
             <a:pPr lvl="4"/>
             <a:r>
-              <a:rPr lang="pt-BR" smtClean="0"/>
+              <a:rPr lang="pt-BR"/>
               <a:t>Quinto nível</a:t>
             </a:r>
             <a:endParaRPr lang="en-US"/>
@@ -1809,7 +1813,7 @@
           <a:p>
             <a:fld id="{EC8C714D-B1CE-464B-BA2D-457A1AE0EA95}" type="datetimeFigureOut">
               <a:rPr lang="en-US" smtClean="0"/>
-              <a:t>06-Aug-17</a:t>
+              <a:t>8/6/2017</a:t>
             </a:fld>
             <a:endParaRPr lang="en-US"/>
           </a:p>
@@ -1903,7 +1907,7 @@
           <a:lstStyle/>
           <a:p>
             <a:r>
-              <a:rPr lang="pt-BR" smtClean="0"/>
+              <a:rPr lang="pt-BR"/>
               <a:t>Clique para editar o título mestre</a:t>
             </a:r>
             <a:endParaRPr lang="en-US"/>
@@ -1927,7 +1931,7 @@
           <a:p>
             <a:fld id="{EC8C714D-B1CE-464B-BA2D-457A1AE0EA95}" type="datetimeFigureOut">
               <a:rPr lang="en-US" smtClean="0"/>
-              <a:t>06-Aug-17</a:t>
+              <a:t>8/6/2017</a:t>
             </a:fld>
             <a:endParaRPr lang="en-US"/>
           </a:p>
@@ -2022,7 +2026,7 @@
           <a:p>
             <a:fld id="{EC8C714D-B1CE-464B-BA2D-457A1AE0EA95}" type="datetimeFigureOut">
               <a:rPr lang="en-US" smtClean="0"/>
-              <a:t>06-Aug-17</a:t>
+              <a:t>8/6/2017</a:t>
             </a:fld>
             <a:endParaRPr lang="en-US"/>
           </a:p>
@@ -2125,7 +2129,7 @@
           </a:lstStyle>
           <a:p>
             <a:r>
-              <a:rPr lang="pt-BR" smtClean="0"/>
+              <a:rPr lang="pt-BR"/>
               <a:t>Clique para editar o título mestre</a:t>
             </a:r>
             <a:endParaRPr lang="en-US"/>
@@ -2182,35 +2186,35 @@
           <a:p>
             <a:pPr lvl="0"/>
             <a:r>
-              <a:rPr lang="pt-BR" smtClean="0"/>
+              <a:rPr lang="pt-BR"/>
               <a:t>Editar estilos de texto Mestre</a:t>
             </a:r>
           </a:p>
           <a:p>
             <a:pPr lvl="1"/>
             <a:r>
-              <a:rPr lang="pt-BR" smtClean="0"/>
+              <a:rPr lang="pt-BR"/>
               <a:t>Segundo nível</a:t>
             </a:r>
           </a:p>
           <a:p>
             <a:pPr lvl="2"/>
             <a:r>
-              <a:rPr lang="pt-BR" smtClean="0"/>
+              <a:rPr lang="pt-BR"/>
               <a:t>Terceiro nível</a:t>
             </a:r>
           </a:p>
           <a:p>
             <a:pPr lvl="3"/>
             <a:r>
-              <a:rPr lang="pt-BR" smtClean="0"/>
+              <a:rPr lang="pt-BR"/>
               <a:t>Quarto nível</a:t>
             </a:r>
           </a:p>
           <a:p>
             <a:pPr lvl="4"/>
             <a:r>
-              <a:rPr lang="pt-BR" smtClean="0"/>
+              <a:rPr lang="pt-BR"/>
               <a:t>Quinto nível</a:t>
             </a:r>
             <a:endParaRPr lang="en-US"/>
@@ -2276,7 +2280,7 @@
           <a:p>
             <a:pPr lvl="0"/>
             <a:r>
-              <a:rPr lang="pt-BR" smtClean="0"/>
+              <a:rPr lang="pt-BR"/>
               <a:t>Editar estilos de texto Mestre</a:t>
             </a:r>
           </a:p>
@@ -2299,7 +2303,7 @@
           <a:p>
             <a:fld id="{EC8C714D-B1CE-464B-BA2D-457A1AE0EA95}" type="datetimeFigureOut">
               <a:rPr lang="en-US" smtClean="0"/>
-              <a:t>06-Aug-17</a:t>
+              <a:t>8/6/2017</a:t>
             </a:fld>
             <a:endParaRPr lang="en-US"/>
           </a:p>
@@ -2401,7 +2405,7 @@
           <a:lstStyle/>
           <a:p>
             <a:r>
-              <a:rPr lang="pt-BR" smtClean="0"/>
+              <a:rPr lang="pt-BR"/>
               <a:t>Clique para editar o título mestre</a:t>
             </a:r>
             <a:endParaRPr lang="en-US"/>
@@ -2425,35 +2429,35 @@
           <a:p>
             <a:pPr lvl="0"/>
             <a:r>
-              <a:rPr lang="pt-BR" smtClean="0"/>
+              <a:rPr lang="pt-BR"/>
               <a:t>Editar estilos de texto Mestre</a:t>
             </a:r>
           </a:p>
           <a:p>
             <a:pPr lvl="1"/>
             <a:r>
-              <a:rPr lang="pt-BR" smtClean="0"/>
+              <a:rPr lang="pt-BR"/>
               <a:t>Segundo nível</a:t>
             </a:r>
           </a:p>
           <a:p>
             <a:pPr lvl="2"/>
             <a:r>
-              <a:rPr lang="pt-BR" smtClean="0"/>
+              <a:rPr lang="pt-BR"/>
               <a:t>Terceiro nível</a:t>
             </a:r>
           </a:p>
           <a:p>
             <a:pPr lvl="3"/>
             <a:r>
-              <a:rPr lang="pt-BR" smtClean="0"/>
+              <a:rPr lang="pt-BR"/>
               <a:t>Quarto nível</a:t>
             </a:r>
           </a:p>
           <a:p>
             <a:pPr lvl="4"/>
             <a:r>
-              <a:rPr lang="pt-BR" smtClean="0"/>
+              <a:rPr lang="pt-BR"/>
               <a:t>Quinto nível</a:t>
             </a:r>
             <a:endParaRPr lang="en-US"/>
@@ -2477,7 +2481,7 @@
           <a:p>
             <a:fld id="{7F232AAC-8AA4-4327-964B-53827A1879F3}" type="datetimeFigureOut">
               <a:rPr lang="en-US" smtClean="0"/>
-              <a:t>06-Aug-17</a:t>
+              <a:t>8/6/2017</a:t>
             </a:fld>
             <a:endParaRPr lang="en-US"/>
           </a:p>
@@ -2610,7 +2614,7 @@
           </a:lstStyle>
           <a:p>
             <a:r>
-              <a:rPr lang="pt-BR" smtClean="0"/>
+              <a:rPr lang="pt-BR"/>
               <a:t>Clique para editar o título mestre</a:t>
             </a:r>
             <a:endParaRPr lang="en-US"/>
@@ -2737,7 +2741,7 @@
           <a:p>
             <a:pPr lvl="0"/>
             <a:r>
-              <a:rPr lang="pt-BR" smtClean="0"/>
+              <a:rPr lang="pt-BR"/>
               <a:t>Editar estilos de texto Mestre</a:t>
             </a:r>
           </a:p>
@@ -2760,7 +2764,7 @@
           <a:p>
             <a:fld id="{EC8C714D-B1CE-464B-BA2D-457A1AE0EA95}" type="datetimeFigureOut">
               <a:rPr lang="en-US" smtClean="0"/>
-              <a:t>06-Aug-17</a:t>
+              <a:t>8/6/2017</a:t>
             </a:fld>
             <a:endParaRPr lang="en-US"/>
           </a:p>
@@ -2854,7 +2858,7 @@
           <a:lstStyle/>
           <a:p>
             <a:r>
-              <a:rPr lang="pt-BR" smtClean="0"/>
+              <a:rPr lang="pt-BR"/>
               <a:t>Clique para editar o título mestre</a:t>
             </a:r>
             <a:endParaRPr lang="en-US"/>
@@ -2878,35 +2882,35 @@
           <a:p>
             <a:pPr lvl="0"/>
             <a:r>
-              <a:rPr lang="pt-BR" smtClean="0"/>
+              <a:rPr lang="pt-BR"/>
               <a:t>Editar estilos de texto Mestre</a:t>
             </a:r>
           </a:p>
           <a:p>
             <a:pPr lvl="1"/>
             <a:r>
-              <a:rPr lang="pt-BR" smtClean="0"/>
+              <a:rPr lang="pt-BR"/>
               <a:t>Segundo nível</a:t>
             </a:r>
           </a:p>
           <a:p>
             <a:pPr lvl="2"/>
             <a:r>
-              <a:rPr lang="pt-BR" smtClean="0"/>
+              <a:rPr lang="pt-BR"/>
               <a:t>Terceiro nível</a:t>
             </a:r>
           </a:p>
           <a:p>
             <a:pPr lvl="3"/>
             <a:r>
-              <a:rPr lang="pt-BR" smtClean="0"/>
+              <a:rPr lang="pt-BR"/>
               <a:t>Quarto nível</a:t>
             </a:r>
           </a:p>
           <a:p>
             <a:pPr lvl="4"/>
             <a:r>
-              <a:rPr lang="pt-BR" smtClean="0"/>
+              <a:rPr lang="pt-BR"/>
               <a:t>Quinto nível</a:t>
             </a:r>
             <a:endParaRPr lang="en-US"/>
@@ -2930,7 +2934,7 @@
           <a:p>
             <a:fld id="{EC8C714D-B1CE-464B-BA2D-457A1AE0EA95}" type="datetimeFigureOut">
               <a:rPr lang="en-US" smtClean="0"/>
-              <a:t>06-Aug-17</a:t>
+              <a:t>8/6/2017</a:t>
             </a:fld>
             <a:endParaRPr lang="en-US"/>
           </a:p>
@@ -3029,7 +3033,7 @@
           <a:lstStyle/>
           <a:p>
             <a:r>
-              <a:rPr lang="pt-BR" smtClean="0"/>
+              <a:rPr lang="pt-BR"/>
               <a:t>Clique para editar o título mestre</a:t>
             </a:r>
             <a:endParaRPr lang="en-US"/>
@@ -3058,35 +3062,35 @@
           <a:p>
             <a:pPr lvl="0"/>
             <a:r>
-              <a:rPr lang="pt-BR" smtClean="0"/>
+              <a:rPr lang="pt-BR"/>
               <a:t>Editar estilos de texto Mestre</a:t>
             </a:r>
           </a:p>
           <a:p>
             <a:pPr lvl="1"/>
             <a:r>
-              <a:rPr lang="pt-BR" smtClean="0"/>
+              <a:rPr lang="pt-BR"/>
               <a:t>Segundo nível</a:t>
             </a:r>
           </a:p>
           <a:p>
             <a:pPr lvl="2"/>
             <a:r>
-              <a:rPr lang="pt-BR" smtClean="0"/>
+              <a:rPr lang="pt-BR"/>
               <a:t>Terceiro nível</a:t>
             </a:r>
           </a:p>
           <a:p>
             <a:pPr lvl="3"/>
             <a:r>
-              <a:rPr lang="pt-BR" smtClean="0"/>
+              <a:rPr lang="pt-BR"/>
               <a:t>Quarto nível</a:t>
             </a:r>
           </a:p>
           <a:p>
             <a:pPr lvl="4"/>
             <a:r>
-              <a:rPr lang="pt-BR" smtClean="0"/>
+              <a:rPr lang="pt-BR"/>
               <a:t>Quinto nível</a:t>
             </a:r>
             <a:endParaRPr lang="en-US"/>
@@ -3110,7 +3114,7 @@
           <a:p>
             <a:fld id="{EC8C714D-B1CE-464B-BA2D-457A1AE0EA95}" type="datetimeFigureOut">
               <a:rPr lang="en-US" smtClean="0"/>
-              <a:t>06-Aug-17</a:t>
+              <a:t>8/6/2017</a:t>
             </a:fld>
             <a:endParaRPr lang="en-US"/>
           </a:p>
@@ -3213,7 +3217,7 @@
           </a:lstStyle>
           <a:p>
             <a:r>
-              <a:rPr lang="pt-BR" smtClean="0"/>
+              <a:rPr lang="pt-BR"/>
               <a:t>Clique para editar o título mestre</a:t>
             </a:r>
             <a:endParaRPr lang="en-US"/>
@@ -3333,7 +3337,7 @@
           <a:p>
             <a:pPr lvl="0"/>
             <a:r>
-              <a:rPr lang="pt-BR" smtClean="0"/>
+              <a:rPr lang="pt-BR"/>
               <a:t>Editar estilos de texto Mestre</a:t>
             </a:r>
           </a:p>
@@ -3356,7 +3360,7 @@
           <a:p>
             <a:fld id="{7F232AAC-8AA4-4327-964B-53827A1879F3}" type="datetimeFigureOut">
               <a:rPr lang="en-US" smtClean="0"/>
-              <a:t>06-Aug-17</a:t>
+              <a:t>8/6/2017</a:t>
             </a:fld>
             <a:endParaRPr lang="en-US"/>
           </a:p>
@@ -3450,7 +3454,7 @@
           <a:lstStyle/>
           <a:p>
             <a:r>
-              <a:rPr lang="pt-BR" smtClean="0"/>
+              <a:rPr lang="pt-BR"/>
               <a:t>Clique para editar o título mestre</a:t>
             </a:r>
             <a:endParaRPr lang="en-US"/>
@@ -3479,35 +3483,35 @@
           <a:p>
             <a:pPr lvl="0"/>
             <a:r>
-              <a:rPr lang="pt-BR" smtClean="0"/>
+              <a:rPr lang="pt-BR"/>
               <a:t>Editar estilos de texto Mestre</a:t>
             </a:r>
           </a:p>
           <a:p>
             <a:pPr lvl="1"/>
             <a:r>
-              <a:rPr lang="pt-BR" smtClean="0"/>
+              <a:rPr lang="pt-BR"/>
               <a:t>Segundo nível</a:t>
             </a:r>
           </a:p>
           <a:p>
             <a:pPr lvl="2"/>
             <a:r>
-              <a:rPr lang="pt-BR" smtClean="0"/>
+              <a:rPr lang="pt-BR"/>
               <a:t>Terceiro nível</a:t>
             </a:r>
           </a:p>
           <a:p>
             <a:pPr lvl="3"/>
             <a:r>
-              <a:rPr lang="pt-BR" smtClean="0"/>
+              <a:rPr lang="pt-BR"/>
               <a:t>Quarto nível</a:t>
             </a:r>
           </a:p>
           <a:p>
             <a:pPr lvl="4"/>
             <a:r>
-              <a:rPr lang="pt-BR" smtClean="0"/>
+              <a:rPr lang="pt-BR"/>
               <a:t>Quinto nível</a:t>
             </a:r>
             <a:endParaRPr lang="en-US"/>
@@ -3536,35 +3540,35 @@
           <a:p>
             <a:pPr lvl="0"/>
             <a:r>
-              <a:rPr lang="pt-BR" smtClean="0"/>
+              <a:rPr lang="pt-BR"/>
               <a:t>Editar estilos de texto Mestre</a:t>
             </a:r>
           </a:p>
           <a:p>
             <a:pPr lvl="1"/>
             <a:r>
-              <a:rPr lang="pt-BR" smtClean="0"/>
+              <a:rPr lang="pt-BR"/>
               <a:t>Segundo nível</a:t>
             </a:r>
           </a:p>
           <a:p>
             <a:pPr lvl="2"/>
             <a:r>
-              <a:rPr lang="pt-BR" smtClean="0"/>
+              <a:rPr lang="pt-BR"/>
               <a:t>Terceiro nível</a:t>
             </a:r>
           </a:p>
           <a:p>
             <a:pPr lvl="3"/>
             <a:r>
-              <a:rPr lang="pt-BR" smtClean="0"/>
+              <a:rPr lang="pt-BR"/>
               <a:t>Quarto nível</a:t>
             </a:r>
           </a:p>
           <a:p>
             <a:pPr lvl="4"/>
             <a:r>
-              <a:rPr lang="pt-BR" smtClean="0"/>
+              <a:rPr lang="pt-BR"/>
               <a:t>Quinto nível</a:t>
             </a:r>
             <a:endParaRPr lang="en-US"/>
@@ -3588,7 +3592,7 @@
           <a:p>
             <a:fld id="{7F232AAC-8AA4-4327-964B-53827A1879F3}" type="datetimeFigureOut">
               <a:rPr lang="en-US" smtClean="0"/>
-              <a:t>06-Aug-17</a:t>
+              <a:t>8/6/2017</a:t>
             </a:fld>
             <a:endParaRPr lang="en-US"/>
           </a:p>
@@ -3687,7 +3691,7 @@
           <a:lstStyle/>
           <a:p>
             <a:r>
-              <a:rPr lang="pt-BR" smtClean="0"/>
+              <a:rPr lang="pt-BR"/>
               <a:t>Clique para editar o título mestre</a:t>
             </a:r>
             <a:endParaRPr lang="en-US"/>
@@ -3753,7 +3757,7 @@
           <a:p>
             <a:pPr lvl="0"/>
             <a:r>
-              <a:rPr lang="pt-BR" smtClean="0"/>
+              <a:rPr lang="pt-BR"/>
               <a:t>Editar estilos de texto Mestre</a:t>
             </a:r>
           </a:p>
@@ -3781,35 +3785,35 @@
           <a:p>
             <a:pPr lvl="0"/>
             <a:r>
-              <a:rPr lang="pt-BR" smtClean="0"/>
+              <a:rPr lang="pt-BR"/>
               <a:t>Editar estilos de texto Mestre</a:t>
             </a:r>
           </a:p>
           <a:p>
             <a:pPr lvl="1"/>
             <a:r>
-              <a:rPr lang="pt-BR" smtClean="0"/>
+              <a:rPr lang="pt-BR"/>
               <a:t>Segundo nível</a:t>
             </a:r>
           </a:p>
           <a:p>
             <a:pPr lvl="2"/>
             <a:r>
-              <a:rPr lang="pt-BR" smtClean="0"/>
+              <a:rPr lang="pt-BR"/>
               <a:t>Terceiro nível</a:t>
             </a:r>
           </a:p>
           <a:p>
             <a:pPr lvl="3"/>
             <a:r>
-              <a:rPr lang="pt-BR" smtClean="0"/>
+              <a:rPr lang="pt-BR"/>
               <a:t>Quarto nível</a:t>
             </a:r>
           </a:p>
           <a:p>
             <a:pPr lvl="4"/>
             <a:r>
-              <a:rPr lang="pt-BR" smtClean="0"/>
+              <a:rPr lang="pt-BR"/>
               <a:t>Quinto nível</a:t>
             </a:r>
             <a:endParaRPr lang="en-US"/>
@@ -3875,7 +3879,7 @@
           <a:p>
             <a:pPr lvl="0"/>
             <a:r>
-              <a:rPr lang="pt-BR" smtClean="0"/>
+              <a:rPr lang="pt-BR"/>
               <a:t>Editar estilos de texto Mestre</a:t>
             </a:r>
           </a:p>
@@ -3903,35 +3907,35 @@
           <a:p>
             <a:pPr lvl="0"/>
             <a:r>
-              <a:rPr lang="pt-BR" smtClean="0"/>
+              <a:rPr lang="pt-BR"/>
               <a:t>Editar estilos de texto Mestre</a:t>
             </a:r>
           </a:p>
           <a:p>
             <a:pPr lvl="1"/>
             <a:r>
-              <a:rPr lang="pt-BR" smtClean="0"/>
+              <a:rPr lang="pt-BR"/>
               <a:t>Segundo nível</a:t>
             </a:r>
           </a:p>
           <a:p>
             <a:pPr lvl="2"/>
             <a:r>
-              <a:rPr lang="pt-BR" smtClean="0"/>
+              <a:rPr lang="pt-BR"/>
               <a:t>Terceiro nível</a:t>
             </a:r>
           </a:p>
           <a:p>
             <a:pPr lvl="3"/>
             <a:r>
-              <a:rPr lang="pt-BR" smtClean="0"/>
+              <a:rPr lang="pt-BR"/>
               <a:t>Quarto nível</a:t>
             </a:r>
           </a:p>
           <a:p>
             <a:pPr lvl="4"/>
             <a:r>
-              <a:rPr lang="pt-BR" smtClean="0"/>
+              <a:rPr lang="pt-BR"/>
               <a:t>Quinto nível</a:t>
             </a:r>
             <a:endParaRPr lang="en-US"/>
@@ -3955,7 +3959,7 @@
           <a:p>
             <a:fld id="{7F232AAC-8AA4-4327-964B-53827A1879F3}" type="datetimeFigureOut">
               <a:rPr lang="en-US" smtClean="0"/>
-              <a:t>06-Aug-17</a:t>
+              <a:t>8/6/2017</a:t>
             </a:fld>
             <a:endParaRPr lang="en-US"/>
           </a:p>
@@ -4049,7 +4053,7 @@
           <a:lstStyle/>
           <a:p>
             <a:r>
-              <a:rPr lang="pt-BR" smtClean="0"/>
+              <a:rPr lang="pt-BR"/>
               <a:t>Clique para editar o título mestre</a:t>
             </a:r>
             <a:endParaRPr lang="en-US"/>
@@ -4073,7 +4077,7 @@
           <a:p>
             <a:fld id="{7F232AAC-8AA4-4327-964B-53827A1879F3}" type="datetimeFigureOut">
               <a:rPr lang="en-US" smtClean="0"/>
-              <a:t>06-Aug-17</a:t>
+              <a:t>8/6/2017</a:t>
             </a:fld>
             <a:endParaRPr lang="en-US"/>
           </a:p>
@@ -4168,7 +4172,7 @@
           <a:p>
             <a:fld id="{7F232AAC-8AA4-4327-964B-53827A1879F3}" type="datetimeFigureOut">
               <a:rPr lang="en-US" smtClean="0"/>
-              <a:t>06-Aug-17</a:t>
+              <a:t>8/6/2017</a:t>
             </a:fld>
             <a:endParaRPr lang="en-US"/>
           </a:p>
@@ -4271,7 +4275,7 @@
           </a:lstStyle>
           <a:p>
             <a:r>
-              <a:rPr lang="pt-BR" smtClean="0"/>
+              <a:rPr lang="pt-BR"/>
               <a:t>Clique para editar o título mestre</a:t>
             </a:r>
             <a:endParaRPr lang="en-US"/>
@@ -4328,35 +4332,35 @@
           <a:p>
             <a:pPr lvl="0"/>
             <a:r>
-              <a:rPr lang="pt-BR" smtClean="0"/>
+              <a:rPr lang="pt-BR"/>
               <a:t>Editar estilos de texto Mestre</a:t>
             </a:r>
           </a:p>
           <a:p>
             <a:pPr lvl="1"/>
             <a:r>
-              <a:rPr lang="pt-BR" smtClean="0"/>
+              <a:rPr lang="pt-BR"/>
               <a:t>Segundo nível</a:t>
             </a:r>
           </a:p>
           <a:p>
             <a:pPr lvl="2"/>
             <a:r>
-              <a:rPr lang="pt-BR" smtClean="0"/>
+              <a:rPr lang="pt-BR"/>
               <a:t>Terceiro nível</a:t>
             </a:r>
           </a:p>
           <a:p>
             <a:pPr lvl="3"/>
             <a:r>
-              <a:rPr lang="pt-BR" smtClean="0"/>
+              <a:rPr lang="pt-BR"/>
               <a:t>Quarto nível</a:t>
             </a:r>
           </a:p>
           <a:p>
             <a:pPr lvl="4"/>
             <a:r>
-              <a:rPr lang="pt-BR" smtClean="0"/>
+              <a:rPr lang="pt-BR"/>
               <a:t>Quinto nível</a:t>
             </a:r>
             <a:endParaRPr lang="en-US"/>
@@ -4422,7 +4426,7 @@
           <a:p>
             <a:pPr lvl="0"/>
             <a:r>
-              <a:rPr lang="pt-BR" smtClean="0"/>
+              <a:rPr lang="pt-BR"/>
               <a:t>Editar estilos de texto Mestre</a:t>
             </a:r>
           </a:p>
@@ -4445,7 +4449,7 @@
           <a:p>
             <a:fld id="{7F232AAC-8AA4-4327-964B-53827A1879F3}" type="datetimeFigureOut">
               <a:rPr lang="en-US" smtClean="0"/>
-              <a:t>06-Aug-17</a:t>
+              <a:t>8/6/2017</a:t>
             </a:fld>
             <a:endParaRPr lang="en-US"/>
           </a:p>
@@ -4548,7 +4552,7 @@
           </a:lstStyle>
           <a:p>
             <a:r>
-              <a:rPr lang="pt-BR" smtClean="0"/>
+              <a:rPr lang="pt-BR"/>
               <a:t>Clique para editar o título mestre</a:t>
             </a:r>
             <a:endParaRPr lang="en-US"/>
@@ -4675,7 +4679,7 @@
           <a:p>
             <a:pPr lvl="0"/>
             <a:r>
-              <a:rPr lang="pt-BR" smtClean="0"/>
+              <a:rPr lang="pt-BR"/>
               <a:t>Editar estilos de texto Mestre</a:t>
             </a:r>
           </a:p>
@@ -4698,7 +4702,7 @@
           <a:p>
             <a:fld id="{7F232AAC-8AA4-4327-964B-53827A1879F3}" type="datetimeFigureOut">
               <a:rPr lang="en-US" smtClean="0"/>
-              <a:t>06-Aug-17</a:t>
+              <a:t>8/6/2017</a:t>
             </a:fld>
             <a:endParaRPr lang="en-US"/>
           </a:p>
@@ -4807,7 +4811,7 @@
           <a:lstStyle/>
           <a:p>
             <a:r>
-              <a:rPr lang="pt-BR" smtClean="0"/>
+              <a:rPr lang="pt-BR"/>
               <a:t>Clique para editar o título mestre</a:t>
             </a:r>
             <a:endParaRPr lang="en-US"/>
@@ -4841,35 +4845,35 @@
           <a:p>
             <a:pPr lvl="0"/>
             <a:r>
-              <a:rPr lang="pt-BR" smtClean="0"/>
+              <a:rPr lang="pt-BR"/>
               <a:t>Editar estilos de texto Mestre</a:t>
             </a:r>
           </a:p>
           <a:p>
             <a:pPr lvl="1"/>
             <a:r>
-              <a:rPr lang="pt-BR" smtClean="0"/>
+              <a:rPr lang="pt-BR"/>
               <a:t>Segundo nível</a:t>
             </a:r>
           </a:p>
           <a:p>
             <a:pPr lvl="2"/>
             <a:r>
-              <a:rPr lang="pt-BR" smtClean="0"/>
+              <a:rPr lang="pt-BR"/>
               <a:t>Terceiro nível</a:t>
             </a:r>
           </a:p>
           <a:p>
             <a:pPr lvl="3"/>
             <a:r>
-              <a:rPr lang="pt-BR" smtClean="0"/>
+              <a:rPr lang="pt-BR"/>
               <a:t>Quarto nível</a:t>
             </a:r>
           </a:p>
           <a:p>
             <a:pPr lvl="4"/>
             <a:r>
-              <a:rPr lang="pt-BR" smtClean="0"/>
+              <a:rPr lang="pt-BR"/>
               <a:t>Quinto nível</a:t>
             </a:r>
             <a:endParaRPr lang="en-US"/>
@@ -4911,7 +4915,7 @@
           <a:p>
             <a:fld id="{7F232AAC-8AA4-4327-964B-53827A1879F3}" type="datetimeFigureOut">
               <a:rPr lang="en-US" smtClean="0"/>
-              <a:t>06-Aug-17</a:t>
+              <a:t>8/6/2017</a:t>
             </a:fld>
             <a:endParaRPr lang="en-US"/>
           </a:p>
@@ -5347,7 +5351,7 @@
           <a:lstStyle/>
           <a:p>
             <a:r>
-              <a:rPr lang="pt-BR" smtClean="0"/>
+              <a:rPr lang="pt-BR"/>
               <a:t>Clique para editar o título mestre</a:t>
             </a:r>
             <a:endParaRPr lang="en-US"/>
@@ -5381,35 +5385,35 @@
           <a:p>
             <a:pPr lvl="0"/>
             <a:r>
-              <a:rPr lang="pt-BR" smtClean="0"/>
+              <a:rPr lang="pt-BR"/>
               <a:t>Editar estilos de texto Mestre</a:t>
             </a:r>
           </a:p>
           <a:p>
             <a:pPr lvl="1"/>
             <a:r>
-              <a:rPr lang="pt-BR" smtClean="0"/>
+              <a:rPr lang="pt-BR"/>
               <a:t>Segundo nível</a:t>
             </a:r>
           </a:p>
           <a:p>
             <a:pPr lvl="2"/>
             <a:r>
-              <a:rPr lang="pt-BR" smtClean="0"/>
+              <a:rPr lang="pt-BR"/>
               <a:t>Terceiro nível</a:t>
             </a:r>
           </a:p>
           <a:p>
             <a:pPr lvl="3"/>
             <a:r>
-              <a:rPr lang="pt-BR" smtClean="0"/>
+              <a:rPr lang="pt-BR"/>
               <a:t>Quarto nível</a:t>
             </a:r>
           </a:p>
           <a:p>
             <a:pPr lvl="4"/>
             <a:r>
-              <a:rPr lang="pt-BR" smtClean="0"/>
+              <a:rPr lang="pt-BR"/>
               <a:t>Quinto nível</a:t>
             </a:r>
             <a:endParaRPr lang="en-US"/>
@@ -5451,7 +5455,7 @@
           <a:p>
             <a:fld id="{EC8C714D-B1CE-464B-BA2D-457A1AE0EA95}" type="datetimeFigureOut">
               <a:rPr lang="en-US" smtClean="0"/>
-              <a:t>06-Aug-17</a:t>
+              <a:t>8/6/2017</a:t>
             </a:fld>
             <a:endParaRPr lang="en-US"/>
           </a:p>
@@ -5864,6 +5868,42 @@
           <a:chExt cx="0" cy="0"/>
         </a:xfrm>
       </p:grpSpPr>
+      <p:pic>
+        <p:nvPicPr>
+          <p:cNvPr id="2" name="Gráfico 1">
+            <a:extLst>
+              <a:ext uri="{FF2B5EF4-FFF2-40B4-BE49-F238E27FC236}">
+                <a16:creationId xmlns:a16="http://schemas.microsoft.com/office/drawing/2014/main" id="{979B9DDF-549D-4716-89B2-25006E64D9B1}"/>
+              </a:ext>
+            </a:extLst>
+          </p:cNvPr>
+          <p:cNvPicPr>
+            <a:picLocks noChangeAspect="1"/>
+          </p:cNvPicPr>
+          <p:nvPr/>
+        </p:nvPicPr>
+        <p:blipFill>
+          <a:blip r:embed="rId2">
+            <a:extLst>
+              <a:ext uri="{96DAC541-7B7A-43D3-8B79-37D633B846F1}">
+                <asvg:svgBlip xmlns:asvg="http://schemas.microsoft.com/office/drawing/2016/SVG/main" r:embed="rId3"/>
+              </a:ext>
+            </a:extLst>
+          </a:blip>
+          <a:stretch>
+            <a:fillRect/>
+          </a:stretch>
+        </p:blipFill>
+        <p:spPr>
+          <a:xfrm>
+            <a:off x="2903455" y="117836"/>
+            <a:ext cx="6598762" cy="6598762"/>
+          </a:xfrm>
+          <a:prstGeom prst="rect">
+            <a:avLst/>
+          </a:prstGeom>
+        </p:spPr>
+      </p:pic>
     </p:spTree>
     <p:extLst>
       <p:ext uri="{BB962C8B-B14F-4D97-AF65-F5344CB8AC3E}">
@@ -5889,7 +5929,86 @@
   <p:timing>
     <p:tnLst>
       <p:par>
-        <p:cTn id="1" dur="indefinite" restart="never" nodeType="tmRoot"/>
+        <p:cTn id="1" dur="indefinite" restart="never" nodeType="tmRoot">
+          <p:childTnLst>
+            <p:seq concurrent="1" nextAc="seek">
+              <p:cTn id="2" dur="indefinite" nodeType="mainSeq">
+                <p:childTnLst>
+                  <p:par>
+                    <p:cTn id="3" fill="hold">
+                      <p:stCondLst>
+                        <p:cond delay="indefinite"/>
+                        <p:cond evt="onBegin" delay="0">
+                          <p:tn val="2"/>
+                        </p:cond>
+                      </p:stCondLst>
+                      <p:childTnLst>
+                        <p:par>
+                          <p:cTn id="4" fill="hold">
+                            <p:stCondLst>
+                              <p:cond delay="0"/>
+                            </p:stCondLst>
+                            <p:childTnLst>
+                              <p:par>
+                                <p:cTn id="5" presetID="10" presetClass="entr" presetSubtype="0" fill="hold" nodeType="afterEffect">
+                                  <p:stCondLst>
+                                    <p:cond delay="0"/>
+                                  </p:stCondLst>
+                                  <p:childTnLst>
+                                    <p:set>
+                                      <p:cBhvr>
+                                        <p:cTn id="6" dur="1" fill="hold">
+                                          <p:stCondLst>
+                                            <p:cond delay="0"/>
+                                          </p:stCondLst>
+                                        </p:cTn>
+                                        <p:tgtEl>
+                                          <p:spTgt spid="2"/>
+                                        </p:tgtEl>
+                                        <p:attrNameLst>
+                                          <p:attrName>style.visibility</p:attrName>
+                                        </p:attrNameLst>
+                                      </p:cBhvr>
+                                      <p:to>
+                                        <p:strVal val="visible"/>
+                                      </p:to>
+                                    </p:set>
+                                    <p:animEffect transition="in" filter="fade">
+                                      <p:cBhvr>
+                                        <p:cTn id="7" dur="500"/>
+                                        <p:tgtEl>
+                                          <p:spTgt spid="2"/>
+                                        </p:tgtEl>
+                                      </p:cBhvr>
+                                    </p:animEffect>
+                                  </p:childTnLst>
+                                </p:cTn>
+                              </p:par>
+                            </p:childTnLst>
+                          </p:cTn>
+                        </p:par>
+                      </p:childTnLst>
+                    </p:cTn>
+                  </p:par>
+                </p:childTnLst>
+              </p:cTn>
+              <p:prevCondLst>
+                <p:cond evt="onPrev" delay="0">
+                  <p:tgtEl>
+                    <p:sldTgt/>
+                  </p:tgtEl>
+                </p:cond>
+              </p:prevCondLst>
+              <p:nextCondLst>
+                <p:cond evt="onNext" delay="0">
+                  <p:tgtEl>
+                    <p:sldTgt/>
+                  </p:tgtEl>
+                </p:cond>
+              </p:nextCondLst>
+            </p:seq>
+          </p:childTnLst>
+        </p:cTn>
       </p:par>
     </p:tnLst>
   </p:timing>
@@ -5940,7 +6059,7 @@
           <a:p>
             <a:pPr algn="ctr"/>
             <a:r>
-              <a:rPr lang="pt-BR" sz="8800" dirty="0" smtClean="0">
+              <a:rPr lang="pt-BR" sz="8800" dirty="0">
                 <a:solidFill>
                   <a:schemeClr val="bg1"/>
                 </a:solidFill>
@@ -6072,13 +6191,6 @@
   <p:transition spd="slow">
     <p:push dir="u"/>
   </p:transition>
-  <p:timing>
-    <p:tnLst>
-      <p:par>
-        <p:cTn id="1" dur="indefinite" restart="never" nodeType="tmRoot"/>
-      </p:par>
-    </p:tnLst>
-  </p:timing>
 </p:sld>
 </file>
 
@@ -6123,7 +6235,7 @@
           <a:p>
             <a:pPr algn="ctr"/>
             <a:r>
-              <a:rPr lang="pt-BR" sz="8800" dirty="0" smtClean="0">
+              <a:rPr lang="pt-BR" sz="8800" dirty="0">
                 <a:solidFill>
                   <a:schemeClr val="bg1"/>
                 </a:solidFill>
@@ -6930,7 +7042,7 @@
           <a:p>
             <a:pPr algn="ctr"/>
             <a:r>
-              <a:rPr lang="pt-BR" sz="8800" dirty="0" smtClean="0">
+              <a:rPr lang="pt-BR" sz="8800" dirty="0">
                 <a:solidFill>
                   <a:schemeClr val="bg1"/>
                 </a:solidFill>
@@ -7450,7 +7562,7 @@
           <a:p>
             <a:pPr algn="ctr"/>
             <a:r>
-              <a:rPr lang="pt-BR" sz="8800" dirty="0" smtClean="0">
+              <a:rPr lang="pt-BR" sz="8800" dirty="0">
                 <a:solidFill>
                   <a:schemeClr val="bg1"/>
                 </a:solidFill>
@@ -8314,7 +8426,7 @@
           <a:p>
             <a:pPr algn="ctr"/>
             <a:r>
-              <a:rPr lang="pt-BR" sz="8800" dirty="0" smtClean="0">
+              <a:rPr lang="pt-BR" sz="8800" dirty="0">
                 <a:solidFill>
                   <a:schemeClr val="bg1"/>
                 </a:solidFill>
@@ -8714,7 +8826,7 @@
           <a:p>
             <a:pPr algn="ctr"/>
             <a:r>
-              <a:rPr lang="pt-BR" sz="8800" dirty="0" smtClean="0">
+              <a:rPr lang="pt-BR" sz="8800" dirty="0">
                 <a:solidFill>
                   <a:schemeClr val="bg1"/>
                 </a:solidFill>
@@ -9463,7 +9575,7 @@
           <a:p>
             <a:pPr algn="ctr"/>
             <a:r>
-              <a:rPr lang="pt-BR" sz="8800" dirty="0" smtClean="0">
+              <a:rPr lang="pt-BR" sz="8800" dirty="0">
                 <a:solidFill>
                   <a:schemeClr val="bg1"/>
                 </a:solidFill>
@@ -9687,25 +9799,6 @@
       </p:grpSpPr>
       <p:sp>
         <p:nvSpPr>
-          <p:cNvPr id="3" name="Espaço Reservado para Conteúdo 2"/>
-          <p:cNvSpPr>
-            <a:spLocks noGrp="1"/>
-          </p:cNvSpPr>
-          <p:nvPr>
-            <p:ph idx="1"/>
-          </p:nvPr>
-        </p:nvSpPr>
-        <p:spPr/>
-        <p:txBody>
-          <a:bodyPr/>
-          <a:lstStyle/>
-          <a:p>
-            <a:endParaRPr lang="en-US"/>
-          </a:p>
-        </p:txBody>
-      </p:sp>
-      <p:sp>
-        <p:nvSpPr>
           <p:cNvPr id="4" name="Título 1"/>
           <p:cNvSpPr>
             <a:spLocks noGrp="1"/>
@@ -9728,7 +9821,7 @@
           <a:p>
             <a:pPr algn="ctr"/>
             <a:r>
-              <a:rPr lang="pt-BR" sz="8800" dirty="0" smtClean="0">
+              <a:rPr lang="pt-BR" sz="8800" dirty="0">
                 <a:solidFill>
                   <a:schemeClr val="bg1"/>
                 </a:solidFill>
@@ -9758,13 +9851,6 @@
   <p:transition spd="slow">
     <p:push dir="u"/>
   </p:transition>
-  <p:timing>
-    <p:tnLst>
-      <p:par>
-        <p:cTn id="1" dur="indefinite" restart="never" nodeType="tmRoot"/>
-      </p:par>
-    </p:tnLst>
-  </p:timing>
 </p:sld>
 </file>
 

</xml_diff>

<commit_message>
Últimas alterações na apresentacao
</commit_message>
<xml_diff>
--- a/ppt/TopBeer.pptx
+++ b/ppt/TopBeer.pptx
@@ -9840,7 +9840,7 @@
       </p:sp>
       <p:pic>
         <p:nvPicPr>
-          <p:cNvPr id="3" name="Imagem 2"/>
+          <p:cNvPr id="2" name="Imagem 1"/>
           <p:cNvPicPr>
             <a:picLocks noChangeAspect="1"/>
           </p:cNvPicPr>
@@ -9854,8 +9854,8 @@
         </p:blipFill>
         <p:spPr>
           <a:xfrm>
-            <a:off x="4817359" y="1825625"/>
-            <a:ext cx="2557282" cy="4781006"/>
+            <a:off x="4876556" y="1825625"/>
+            <a:ext cx="2438887" cy="4893457"/>
           </a:xfrm>
           <a:prstGeom prst="rect">
             <a:avLst/>
@@ -9878,6 +9878,13 @@
   <p:transition spd="slow">
     <p:push dir="u"/>
   </p:transition>
+  <p:timing>
+    <p:tnLst>
+      <p:par>
+        <p:cTn id="1" dur="indefinite" restart="never" nodeType="tmRoot"/>
+      </p:par>
+    </p:tnLst>
+  </p:timing>
 </p:sld>
 </file>
 

</xml_diff>